<commit_message>
docs (entrega): subida de tesis.pdf
</commit_message>
<xml_diff>
--- a/docs/presentacion.pptx
+++ b/docs/presentacion.pptx
@@ -5,7 +5,7 @@
     <p:sldMasterId id="2147483659" r:id="rId1"/>
   </p:sldMasterIdLst>
   <p:notesMasterIdLst>
-    <p:notesMasterId r:id="rId18"/>
+    <p:notesMasterId r:id="rId17"/>
   </p:notesMasterIdLst>
   <p:sldIdLst>
     <p:sldId id="256" r:id="rId2"/>
@@ -19,21 +19,20 @@
     <p:sldId id="286" r:id="rId10"/>
     <p:sldId id="281" r:id="rId11"/>
     <p:sldId id="282" r:id="rId12"/>
-    <p:sldId id="287" r:id="rId13"/>
-    <p:sldId id="289" r:id="rId14"/>
+    <p:sldId id="292" r:id="rId13"/>
+    <p:sldId id="287" r:id="rId14"/>
     <p:sldId id="283" r:id="rId15"/>
-    <p:sldId id="290" r:id="rId16"/>
-    <p:sldId id="275" r:id="rId17"/>
+    <p:sldId id="275" r:id="rId16"/>
   </p:sldIdLst>
   <p:sldSz cx="9144000" cy="5143500" type="screen16x9"/>
   <p:notesSz cx="6858000" cy="9144000"/>
   <p:embeddedFontLst>
     <p:embeddedFont>
       <p:font typeface="Helvetica Neue" panose="020B0604020202020204" charset="0"/>
-      <p:regular r:id="rId19"/>
-      <p:bold r:id="rId20"/>
-      <p:italic r:id="rId21"/>
-      <p:boldItalic r:id="rId22"/>
+      <p:regular r:id="rId18"/>
+      <p:bold r:id="rId19"/>
+      <p:italic r:id="rId20"/>
+      <p:boldItalic r:id="rId21"/>
     </p:embeddedFont>
   </p:embeddedFontLst>
   <p:defaultTextStyle>
@@ -2870,7 +2869,7 @@
         <p:cNvPr id="1" name="Shape 65">
           <a:extLst>
             <a:ext uri="{FF2B5EF4-FFF2-40B4-BE49-F238E27FC236}">
-              <a16:creationId xmlns:a16="http://schemas.microsoft.com/office/drawing/2014/main" id="{EA631530-9A4D-E4E0-5AB1-152659816A02}"/>
+              <a16:creationId xmlns:a16="http://schemas.microsoft.com/office/drawing/2014/main" id="{730AD114-17E5-1F09-E87C-5B1207142B05}"/>
             </a:ext>
           </a:extLst>
         </p:cNvPr>
@@ -2890,7 +2889,7 @@
           <p:cNvPr id="66" name="Google Shape;66;g2fdea72edd2_0_58:notes">
             <a:extLst>
               <a:ext uri="{FF2B5EF4-FFF2-40B4-BE49-F238E27FC236}">
-                <a16:creationId xmlns:a16="http://schemas.microsoft.com/office/drawing/2014/main" id="{E5BB9654-9AD1-09FF-7457-5A66117DC9F8}"/>
+                <a16:creationId xmlns:a16="http://schemas.microsoft.com/office/drawing/2014/main" id="{FC963577-1CF0-6659-A063-6A20AA67A6C1}"/>
               </a:ext>
             </a:extLst>
           </p:cNvPr>
@@ -2947,7 +2946,7 @@
           <p:cNvPr id="67" name="Google Shape;67;g2fdea72edd2_0_58:notes">
             <a:extLst>
               <a:ext uri="{FF2B5EF4-FFF2-40B4-BE49-F238E27FC236}">
-                <a16:creationId xmlns:a16="http://schemas.microsoft.com/office/drawing/2014/main" id="{A60220A9-118B-7B92-7175-A4BB33FD6D25}"/>
+                <a16:creationId xmlns:a16="http://schemas.microsoft.com/office/drawing/2014/main" id="{9A9014A2-3520-2B40-63B4-823322E78B14}"/>
               </a:ext>
             </a:extLst>
           </p:cNvPr>
@@ -3079,7 +3078,7 @@
           <p:cNvPr id="68" name="Google Shape;68;g2fdea72edd2_0_58:notes">
             <a:extLst>
               <a:ext uri="{FF2B5EF4-FFF2-40B4-BE49-F238E27FC236}">
-                <a16:creationId xmlns:a16="http://schemas.microsoft.com/office/drawing/2014/main" id="{CB865648-5B16-4A1D-FBC5-B76935FFB327}"/>
+                <a16:creationId xmlns:a16="http://schemas.microsoft.com/office/drawing/2014/main" id="{861F5860-88A8-11A7-08C6-F6F74C5CE084}"/>
               </a:ext>
             </a:extLst>
           </p:cNvPr>
@@ -3153,7 +3152,7 @@
     </p:spTree>
     <p:extLst>
       <p:ext uri="{BB962C8B-B14F-4D97-AF65-F5344CB8AC3E}">
-        <p14:creationId xmlns:p14="http://schemas.microsoft.com/office/powerpoint/2010/main" val="3599090747"/>
+        <p14:creationId xmlns:p14="http://schemas.microsoft.com/office/powerpoint/2010/main" val="3678978422"/>
       </p:ext>
     </p:extLst>
   </p:cSld>
@@ -3171,7 +3170,7 @@
         <p:cNvPr id="1" name="Shape 65">
           <a:extLst>
             <a:ext uri="{FF2B5EF4-FFF2-40B4-BE49-F238E27FC236}">
-              <a16:creationId xmlns:a16="http://schemas.microsoft.com/office/drawing/2014/main" id="{B812F998-F81C-18FB-9370-48799EA6EC52}"/>
+              <a16:creationId xmlns:a16="http://schemas.microsoft.com/office/drawing/2014/main" id="{EA631530-9A4D-E4E0-5AB1-152659816A02}"/>
             </a:ext>
           </a:extLst>
         </p:cNvPr>
@@ -3191,7 +3190,7 @@
           <p:cNvPr id="66" name="Google Shape;66;g2fdea72edd2_0_58:notes">
             <a:extLst>
               <a:ext uri="{FF2B5EF4-FFF2-40B4-BE49-F238E27FC236}">
-                <a16:creationId xmlns:a16="http://schemas.microsoft.com/office/drawing/2014/main" id="{F862AE41-DCBF-44DC-F2D7-A6041931EDF1}"/>
+                <a16:creationId xmlns:a16="http://schemas.microsoft.com/office/drawing/2014/main" id="{E5BB9654-9AD1-09FF-7457-5A66117DC9F8}"/>
               </a:ext>
             </a:extLst>
           </p:cNvPr>
@@ -3248,7 +3247,7 @@
           <p:cNvPr id="67" name="Google Shape;67;g2fdea72edd2_0_58:notes">
             <a:extLst>
               <a:ext uri="{FF2B5EF4-FFF2-40B4-BE49-F238E27FC236}">
-                <a16:creationId xmlns:a16="http://schemas.microsoft.com/office/drawing/2014/main" id="{E9EE8F1B-8754-C220-1D72-3CB4A132C4E2}"/>
+                <a16:creationId xmlns:a16="http://schemas.microsoft.com/office/drawing/2014/main" id="{A60220A9-118B-7B92-7175-A4BB33FD6D25}"/>
               </a:ext>
             </a:extLst>
           </p:cNvPr>
@@ -3380,7 +3379,7 @@
           <p:cNvPr id="68" name="Google Shape;68;g2fdea72edd2_0_58:notes">
             <a:extLst>
               <a:ext uri="{FF2B5EF4-FFF2-40B4-BE49-F238E27FC236}">
-                <a16:creationId xmlns:a16="http://schemas.microsoft.com/office/drawing/2014/main" id="{691F635B-F866-B734-198A-866BFAD3EBA4}"/>
+                <a16:creationId xmlns:a16="http://schemas.microsoft.com/office/drawing/2014/main" id="{CB865648-5B16-4A1D-FBC5-B76935FFB327}"/>
               </a:ext>
             </a:extLst>
           </p:cNvPr>
@@ -3454,7 +3453,7 @@
     </p:spTree>
     <p:extLst>
       <p:ext uri="{BB962C8B-B14F-4D97-AF65-F5344CB8AC3E}">
-        <p14:creationId xmlns:p14="http://schemas.microsoft.com/office/powerpoint/2010/main" val="348273134"/>
+        <p14:creationId xmlns:p14="http://schemas.microsoft.com/office/powerpoint/2010/main" val="3599090747"/>
       </p:ext>
     </p:extLst>
   </p:cSld>
@@ -3579,219 +3578,91 @@
           </a:bodyPr>
           <a:lstStyle/>
           <a:p>
-            <a:pPr marL="0" lvl="0" indent="0" algn="l" rtl="0">
-              <a:spcBef>
-                <a:spcPts val="0"/>
-              </a:spcBef>
-              <a:spcAft>
-                <a:spcPts val="0"/>
-              </a:spcAft>
-              <a:buNone/>
-            </a:pPr>
-            <a:endParaRPr lang="es-CL" dirty="0"/>
-          </a:p>
-          <a:p>
             <a:r>
-              <a:rPr lang="es-MX" b="1" dirty="0"/>
-              <a:t>Datos:</a:t>
+              <a:rPr lang="es-MX" sz="1100" b="1" dirty="0"/>
+              <a:t>Modelo </a:t>
             </a:r>
-          </a:p>
-          <a:p>
-            <a:pPr>
+            <a:r>
+              <a:rPr lang="es-MX" sz="1100" b="1" dirty="0" err="1"/>
+              <a:t>SparseTwoTower</a:t>
+            </a:r>
+            <a:r>
+              <a:rPr lang="es-MX" sz="1100" b="1" dirty="0"/>
+              <a:t> con torres V3</a:t>
+            </a:r>
+            <a:r>
+              <a:rPr lang="es-MX" sz="1100" dirty="0"/>
+              <a:t> </a:t>
+            </a:r>
+            <a:endParaRPr lang="es-MX" sz="1100" b="1" dirty="0"/>
+          </a:p>
+          <a:p>
+            <a:pPr marL="171450" indent="-171450">
               <a:buFont typeface="Arial" panose="020B0604020202020204" pitchFamily="34" charset="0"/>
               <a:buChar char="•"/>
             </a:pPr>
             <a:r>
-              <a:rPr lang="es-MX" b="1" dirty="0"/>
-              <a:t>Escasez de datos</a:t>
+              <a:rPr lang="es-MX" sz="1100" b="1" dirty="0"/>
+              <a:t>Cobertura</a:t>
             </a:r>
             <a:r>
-              <a:rPr lang="es-MX" dirty="0"/>
-              <a:t>: Si hay pocos datos de interacción, los </a:t>
+              <a:rPr lang="es-MX" sz="1100" dirty="0"/>
+              <a:t>: Logra una cobertura razonable del 77.36%.</a:t>
+            </a:r>
+          </a:p>
+          <a:p>
+            <a:pPr marL="171450" indent="-171450">
+              <a:buFont typeface="Arial" panose="020B0604020202020204" pitchFamily="34" charset="0"/>
+              <a:buChar char="•"/>
+            </a:pPr>
+            <a:r>
+              <a:rPr lang="es-MX" sz="1100" b="1" dirty="0"/>
+              <a:t>Novedad</a:t>
             </a:r>
             <a:r>
-              <a:rPr lang="es-MX" dirty="0" err="1"/>
-              <a:t>embeddings</a:t>
+              <a:rPr lang="es-MX" sz="1100" dirty="0"/>
+              <a:t>: Con una puntuación de 1.7603, es capaz de recomendar ítems menos populares.</a:t>
+            </a:r>
+          </a:p>
+          <a:p>
+            <a:pPr marL="171450" indent="-171450">
+              <a:buFont typeface="Arial" panose="020B0604020202020204" pitchFamily="34" charset="0"/>
+              <a:buChar char="•"/>
+            </a:pPr>
+            <a:r>
+              <a:rPr lang="es-MX" sz="1100" b="1" dirty="0"/>
+              <a:t>Precisión y </a:t>
             </a:r>
             <a:r>
-              <a:rPr lang="es-MX" dirty="0"/>
-              <a:t> pueden no capturar relaciones significativas.</a:t>
+              <a:rPr lang="es-MX" sz="1100" b="1" dirty="0" err="1"/>
+              <a:t>Recall</a:t>
             </a:r>
-          </a:p>
-          <a:p>
-            <a:pPr>
+            <a:r>
+              <a:rPr lang="es-MX" sz="1100" dirty="0"/>
+              <a:t>: Aunque no lidera en todas las métricas de precisión y </a:t>
+            </a:r>
+            <a:r>
+              <a:rPr lang="es-MX" sz="1100" dirty="0" err="1"/>
+              <a:t>recall</a:t>
+            </a:r>
+            <a:r>
+              <a:rPr lang="es-MX" sz="1100" dirty="0"/>
+              <a:t>, mantiene un rendimiento competitivo (Precision@5: 0.7474 y Recall@5: 0.3791).</a:t>
+            </a:r>
+          </a:p>
+          <a:p>
+            <a:pPr marL="171450" indent="-171450">
               <a:buFont typeface="Arial" panose="020B0604020202020204" pitchFamily="34" charset="0"/>
               <a:buChar char="•"/>
             </a:pPr>
             <a:r>
-              <a:rPr lang="es-MX" b="1" dirty="0"/>
-              <a:t>Desbalanceo</a:t>
+              <a:rPr lang="es-MX" sz="1100" b="1" dirty="0"/>
+              <a:t>Sesgo de Popularidad</a:t>
             </a:r>
             <a:r>
-              <a:rPr lang="es-MX" dirty="0"/>
-              <a:t>: La popularidad de ciertos ítems puede sesgar las recomendaciones hacia estos.</a:t>
+              <a:rPr lang="es-MX" sz="1100" dirty="0"/>
+              <a:t>: Tiene uno de los sesgos más bajos (203.1619), mostrando una preferencia reducida por ítems populares</a:t>
             </a:r>
-          </a:p>
-          <a:p>
-            <a:r>
-              <a:rPr lang="es-MX" b="1" dirty="0"/>
-              <a:t>Modelo:</a:t>
-            </a:r>
-          </a:p>
-          <a:p>
-            <a:pPr>
-              <a:buFont typeface="Arial" panose="020B0604020202020204" pitchFamily="34" charset="0"/>
-              <a:buChar char="•"/>
-            </a:pPr>
-            <a:r>
-              <a:rPr lang="es-MX" b="1" dirty="0"/>
-              <a:t>Sesgo de popularidad</a:t>
-            </a:r>
-            <a:r>
-              <a:rPr lang="es-MX" dirty="0"/>
-              <a:t>: Puede favorecer ítems populares, limitando la diversidad y novedad de las recomendaciones.</a:t>
-            </a:r>
-          </a:p>
-          <a:p>
-            <a:pPr>
-              <a:buFont typeface="Arial" panose="020B0604020202020204" pitchFamily="34" charset="0"/>
-              <a:buChar char="•"/>
-            </a:pPr>
-            <a:r>
-              <a:rPr lang="es-MX" b="1" dirty="0"/>
-              <a:t>Generalización</a:t>
-            </a:r>
-            <a:r>
-              <a:rPr lang="es-MX" dirty="0"/>
-              <a:t>: Las combinaciones usuario-ítem no vistas durante el entrenamiento pueden no ser manejadas adecuadamente.</a:t>
-            </a:r>
-          </a:p>
-          <a:p>
-            <a:pPr marL="0" lvl="0" indent="0" algn="l" rtl="0">
-              <a:spcBef>
-                <a:spcPts val="0"/>
-              </a:spcBef>
-              <a:spcAft>
-                <a:spcPts val="0"/>
-              </a:spcAft>
-              <a:buNone/>
-            </a:pPr>
-            <a:endParaRPr lang="es-CL" dirty="0"/>
-          </a:p>
-          <a:p>
-            <a:pPr marL="0" lvl="0" indent="0" algn="l" rtl="0">
-              <a:spcBef>
-                <a:spcPts val="0"/>
-              </a:spcBef>
-              <a:spcAft>
-                <a:spcPts val="0"/>
-              </a:spcAft>
-              <a:buNone/>
-            </a:pPr>
-            <a:endParaRPr lang="es-CL" dirty="0"/>
-          </a:p>
-          <a:p>
-            <a:pPr marL="0" lvl="0" indent="0" algn="l" rtl="0">
-              <a:spcBef>
-                <a:spcPts val="0"/>
-              </a:spcBef>
-              <a:spcAft>
-                <a:spcPts val="0"/>
-              </a:spcAft>
-              <a:buNone/>
-            </a:pPr>
-            <a:r>
-              <a:rPr lang="es-MX" b="1" dirty="0"/>
-              <a:t>Regularización del sesgo de popularidad</a:t>
-            </a:r>
-            <a:r>
-              <a:rPr lang="es-MX" dirty="0"/>
-              <a:t>: Introducir penalizaciones para reducir la preferencia hacia ítems </a:t>
-            </a:r>
-            <a:r>
-              <a:rPr lang="es-MX" dirty="0" err="1"/>
-              <a:t>populares.</a:t>
-            </a:r>
-            <a:r>
-              <a:rPr lang="es-MX" b="1" dirty="0" err="1"/>
-              <a:t>Mejora</a:t>
-            </a:r>
-            <a:r>
-              <a:rPr lang="es-MX" b="1" dirty="0"/>
-              <a:t> de las métricas de novedad</a:t>
-            </a:r>
-            <a:r>
-              <a:rPr lang="es-MX" dirty="0"/>
-              <a:t>: Aumentar la diversidad de las </a:t>
-            </a:r>
-            <a:r>
-              <a:rPr lang="es-MX" dirty="0" err="1"/>
-              <a:t>recomendaciones.</a:t>
-            </a:r>
-            <a:r>
-              <a:rPr lang="es-MX" b="1" dirty="0" err="1"/>
-              <a:t>Cambio</a:t>
-            </a:r>
-            <a:r>
-              <a:rPr lang="es-MX" b="1" dirty="0"/>
-              <a:t> de función de pérdida</a:t>
-            </a:r>
-            <a:r>
-              <a:rPr lang="es-MX" dirty="0"/>
-              <a:t>: Probar alternativas como Focal </a:t>
-            </a:r>
-            <a:r>
-              <a:rPr lang="es-MX" dirty="0" err="1"/>
-              <a:t>Loss</a:t>
-            </a:r>
-            <a:r>
-              <a:rPr lang="es-MX" dirty="0"/>
-              <a:t> para abordar desbalanceo de </a:t>
-            </a:r>
-            <a:r>
-              <a:rPr lang="es-MX" dirty="0" err="1"/>
-              <a:t>clases.</a:t>
-            </a:r>
-            <a:r>
-              <a:rPr lang="es-MX" b="1" dirty="0" err="1"/>
-              <a:t>Customización</a:t>
-            </a:r>
-            <a:r>
-              <a:rPr lang="es-MX" b="1" dirty="0"/>
-              <a:t> del modelo</a:t>
-            </a:r>
-            <a:r>
-              <a:rPr lang="es-MX" dirty="0"/>
-              <a:t>: Introducir arquitecturas alternativas para las torres (</a:t>
-            </a:r>
-            <a:r>
-              <a:rPr lang="es-MX" dirty="0" err="1"/>
-              <a:t>e.g</a:t>
-            </a:r>
-            <a:r>
-              <a:rPr lang="es-MX" dirty="0"/>
-              <a:t>., incluir capas convolucionales o recurrentes).</a:t>
-            </a:r>
-            <a:r>
-              <a:rPr lang="es-MX" b="1" dirty="0"/>
-              <a:t>Inclusión de más datos contextuales</a:t>
-            </a:r>
-            <a:r>
-              <a:rPr lang="es-MX" dirty="0"/>
-              <a:t>: Incorporar información temporal o contextual para enriquecer las recomendaciones.</a:t>
-            </a:r>
-            <a:endParaRPr lang="es-CL" dirty="0"/>
-          </a:p>
-          <a:p>
-            <a:pPr marL="0" lvl="0" indent="0" algn="l" rtl="0">
-              <a:spcBef>
-                <a:spcPts val="0"/>
-              </a:spcBef>
-              <a:spcAft>
-                <a:spcPts val="0"/>
-              </a:spcAft>
-              <a:buNone/>
-            </a:pPr>
             <a:endParaRPr lang="es-CL" dirty="0"/>
           </a:p>
           <a:p>
@@ -3922,463 +3793,6 @@
 </file>
 
 <file path=ppt/notesSlides/notesSlide15.xml><?xml version="1.0" encoding="utf-8"?>
-<p:notes xmlns:a="http://schemas.openxmlformats.org/drawingml/2006/main" xmlns:r="http://schemas.openxmlformats.org/officeDocument/2006/relationships" xmlns:p="http://schemas.openxmlformats.org/presentationml/2006/main" showMasterSp="0" showMasterPhAnim="0">
-  <p:cSld>
-    <p:spTree>
-      <p:nvGrpSpPr>
-        <p:cNvPr id="1" name="Shape 65">
-          <a:extLst>
-            <a:ext uri="{FF2B5EF4-FFF2-40B4-BE49-F238E27FC236}">
-              <a16:creationId xmlns:a16="http://schemas.microsoft.com/office/drawing/2014/main" id="{6D801488-BDE6-DD3A-FD1B-6F345DABA1A2}"/>
-            </a:ext>
-          </a:extLst>
-        </p:cNvPr>
-        <p:cNvGrpSpPr/>
-        <p:nvPr/>
-      </p:nvGrpSpPr>
-      <p:grpSpPr>
-        <a:xfrm>
-          <a:off x="0" y="0"/>
-          <a:ext cx="0" cy="0"/>
-          <a:chOff x="0" y="0"/>
-          <a:chExt cx="0" cy="0"/>
-        </a:xfrm>
-      </p:grpSpPr>
-      <p:sp>
-        <p:nvSpPr>
-          <p:cNvPr id="66" name="Google Shape;66;g2fdea72edd2_0_58:notes">
-            <a:extLst>
-              <a:ext uri="{FF2B5EF4-FFF2-40B4-BE49-F238E27FC236}">
-                <a16:creationId xmlns:a16="http://schemas.microsoft.com/office/drawing/2014/main" id="{3E60A6E5-C148-3F15-682A-FE61F4E6FEA3}"/>
-              </a:ext>
-            </a:extLst>
-          </p:cNvPr>
-          <p:cNvSpPr>
-            <a:spLocks noGrp="1" noRot="1" noChangeAspect="1"/>
-          </p:cNvSpPr>
-          <p:nvPr>
-            <p:ph type="sldImg" idx="2"/>
-          </p:nvPr>
-        </p:nvSpPr>
-        <p:spPr>
-          <a:xfrm>
-            <a:off x="685800" y="1143000"/>
-            <a:ext cx="5486400" cy="3086100"/>
-          </a:xfrm>
-          <a:custGeom>
-            <a:avLst/>
-            <a:gdLst/>
-            <a:ahLst/>
-            <a:cxnLst/>
-            <a:rect l="l" t="t" r="r" b="b"/>
-            <a:pathLst>
-              <a:path w="120000" h="120000" extrusionOk="0">
-                <a:moveTo>
-                  <a:pt x="0" y="0"/>
-                </a:moveTo>
-                <a:lnTo>
-                  <a:pt x="120000" y="0"/>
-                </a:lnTo>
-                <a:lnTo>
-                  <a:pt x="120000" y="120000"/>
-                </a:lnTo>
-                <a:lnTo>
-                  <a:pt x="0" y="120000"/>
-                </a:lnTo>
-                <a:close/>
-              </a:path>
-            </a:pathLst>
-          </a:custGeom>
-          <a:noFill/>
-          <a:ln w="12700" cap="flat" cmpd="sng">
-            <a:solidFill>
-              <a:srgbClr val="000000"/>
-            </a:solidFill>
-            <a:prstDash val="solid"/>
-            <a:round/>
-            <a:headEnd type="none" w="sm" len="sm"/>
-            <a:tailEnd type="none" w="sm" len="sm"/>
-          </a:ln>
-        </p:spPr>
-      </p:sp>
-      <p:sp>
-        <p:nvSpPr>
-          <p:cNvPr id="67" name="Google Shape;67;g2fdea72edd2_0_58:notes">
-            <a:extLst>
-              <a:ext uri="{FF2B5EF4-FFF2-40B4-BE49-F238E27FC236}">
-                <a16:creationId xmlns:a16="http://schemas.microsoft.com/office/drawing/2014/main" id="{A1C8E5F6-A7B0-1A23-2163-C45FF11DB477}"/>
-              </a:ext>
-            </a:extLst>
-          </p:cNvPr>
-          <p:cNvSpPr txBox="1">
-            <a:spLocks noGrp="1"/>
-          </p:cNvSpPr>
-          <p:nvPr>
-            <p:ph type="body" idx="1"/>
-          </p:nvPr>
-        </p:nvSpPr>
-        <p:spPr>
-          <a:xfrm>
-            <a:off x="685800" y="4400550"/>
-            <a:ext cx="5486400" cy="3600600"/>
-          </a:xfrm>
-          <a:prstGeom prst="rect">
-            <a:avLst/>
-          </a:prstGeom>
-          <a:noFill/>
-          <a:ln>
-            <a:noFill/>
-          </a:ln>
-        </p:spPr>
-        <p:txBody>
-          <a:bodyPr spcFirstLastPara="1" wrap="square" lIns="91425" tIns="45700" rIns="91425" bIns="45700" anchor="t" anchorCtr="0">
-            <a:noAutofit/>
-          </a:bodyPr>
-          <a:lstStyle/>
-          <a:p>
-            <a:pPr marL="0" lvl="0" indent="0" algn="l" rtl="0">
-              <a:spcBef>
-                <a:spcPts val="0"/>
-              </a:spcBef>
-              <a:spcAft>
-                <a:spcPts val="0"/>
-              </a:spcAft>
-              <a:buNone/>
-            </a:pPr>
-            <a:endParaRPr lang="es-CL" dirty="0"/>
-          </a:p>
-          <a:p>
-            <a:r>
-              <a:rPr lang="es-MX" b="1" dirty="0"/>
-              <a:t>Datos:</a:t>
-            </a:r>
-          </a:p>
-          <a:p>
-            <a:pPr>
-              <a:buFont typeface="Arial" panose="020B0604020202020204" pitchFamily="34" charset="0"/>
-              <a:buChar char="•"/>
-            </a:pPr>
-            <a:r>
-              <a:rPr lang="es-MX" b="1" dirty="0"/>
-              <a:t>Escasez de datos</a:t>
-            </a:r>
-            <a:r>
-              <a:rPr lang="es-MX" dirty="0"/>
-              <a:t>: Si hay pocos datos de interacción, los </a:t>
-            </a:r>
-            <a:r>
-              <a:rPr lang="es-MX" dirty="0" err="1"/>
-              <a:t>embeddings</a:t>
-            </a:r>
-            <a:r>
-              <a:rPr lang="es-MX" dirty="0"/>
-              <a:t> pueden no capturar relaciones significativas.</a:t>
-            </a:r>
-          </a:p>
-          <a:p>
-            <a:pPr>
-              <a:buFont typeface="Arial" panose="020B0604020202020204" pitchFamily="34" charset="0"/>
-              <a:buChar char="•"/>
-            </a:pPr>
-            <a:r>
-              <a:rPr lang="es-MX" b="1" dirty="0"/>
-              <a:t>Desbalanceo</a:t>
-            </a:r>
-            <a:r>
-              <a:rPr lang="es-MX" dirty="0"/>
-              <a:t>: La popularidad de ciertos ítems puede sesgar las recomendaciones hacia estos.</a:t>
-            </a:r>
-          </a:p>
-          <a:p>
-            <a:r>
-              <a:rPr lang="es-MX" b="1" dirty="0"/>
-              <a:t>Modelo:</a:t>
-            </a:r>
-          </a:p>
-          <a:p>
-            <a:pPr>
-              <a:buFont typeface="Arial" panose="020B0604020202020204" pitchFamily="34" charset="0"/>
-              <a:buChar char="•"/>
-            </a:pPr>
-            <a:r>
-              <a:rPr lang="es-MX" b="1" dirty="0"/>
-              <a:t>Sesgo de popularidad</a:t>
-            </a:r>
-            <a:r>
-              <a:rPr lang="es-MX" dirty="0"/>
-              <a:t>: Puede favorecer ítems populares, limitando la diversidad y novedad de las recomendaciones.</a:t>
-            </a:r>
-          </a:p>
-          <a:p>
-            <a:pPr>
-              <a:buFont typeface="Arial" panose="020B0604020202020204" pitchFamily="34" charset="0"/>
-              <a:buChar char="•"/>
-            </a:pPr>
-            <a:r>
-              <a:rPr lang="es-MX" b="1" dirty="0"/>
-              <a:t>Generalización</a:t>
-            </a:r>
-            <a:r>
-              <a:rPr lang="es-MX" dirty="0"/>
-              <a:t>: Las combinaciones usuario-ítem no vistas durante el entrenamiento pueden no ser manejadas adecuadamente.</a:t>
-            </a:r>
-          </a:p>
-          <a:p>
-            <a:pPr marL="0" lvl="0" indent="0" algn="l" rtl="0">
-              <a:spcBef>
-                <a:spcPts val="0"/>
-              </a:spcBef>
-              <a:spcAft>
-                <a:spcPts val="0"/>
-              </a:spcAft>
-              <a:buNone/>
-            </a:pPr>
-            <a:endParaRPr lang="es-CL" dirty="0"/>
-          </a:p>
-          <a:p>
-            <a:pPr marL="0" lvl="0" indent="0" algn="l" rtl="0">
-              <a:spcBef>
-                <a:spcPts val="0"/>
-              </a:spcBef>
-              <a:spcAft>
-                <a:spcPts val="0"/>
-              </a:spcAft>
-              <a:buNone/>
-            </a:pPr>
-            <a:endParaRPr lang="es-CL" dirty="0"/>
-          </a:p>
-          <a:p>
-            <a:pPr marL="0" lvl="0" indent="0" algn="l" rtl="0">
-              <a:spcBef>
-                <a:spcPts val="0"/>
-              </a:spcBef>
-              <a:spcAft>
-                <a:spcPts val="0"/>
-              </a:spcAft>
-              <a:buNone/>
-            </a:pPr>
-            <a:r>
-              <a:rPr lang="es-MX" b="1" dirty="0"/>
-              <a:t>Regularización del sesgo de popularidad</a:t>
-            </a:r>
-            <a:r>
-              <a:rPr lang="es-MX" dirty="0"/>
-              <a:t>: Introducir penalizaciones para reducir la preferencia hacia ítems </a:t>
-            </a:r>
-            <a:r>
-              <a:rPr lang="es-MX" dirty="0" err="1"/>
-              <a:t>populares.</a:t>
-            </a:r>
-            <a:r>
-              <a:rPr lang="es-MX" b="1" dirty="0" err="1"/>
-              <a:t>Mejora</a:t>
-            </a:r>
-            <a:r>
-              <a:rPr lang="es-MX" b="1" dirty="0"/>
-              <a:t> de las métricas de novedad</a:t>
-            </a:r>
-            <a:r>
-              <a:rPr lang="es-MX" dirty="0"/>
-              <a:t>: Aumentar la diversidad de las </a:t>
-            </a:r>
-            <a:r>
-              <a:rPr lang="es-MX" dirty="0" err="1"/>
-              <a:t>recomendaciones.</a:t>
-            </a:r>
-            <a:r>
-              <a:rPr lang="es-MX" b="1" dirty="0" err="1"/>
-              <a:t>Cambio</a:t>
-            </a:r>
-            <a:r>
-              <a:rPr lang="es-MX" b="1" dirty="0"/>
-              <a:t> de función de pérdida</a:t>
-            </a:r>
-            <a:r>
-              <a:rPr lang="es-MX" dirty="0"/>
-              <a:t>: Probar alternativas como Focal </a:t>
-            </a:r>
-            <a:r>
-              <a:rPr lang="es-MX" dirty="0" err="1"/>
-              <a:t>Loss</a:t>
-            </a:r>
-            <a:r>
-              <a:rPr lang="es-MX" dirty="0"/>
-              <a:t> para abordar desbalanceo de </a:t>
-            </a:r>
-            <a:r>
-              <a:rPr lang="es-MX" dirty="0" err="1"/>
-              <a:t>clases.</a:t>
-            </a:r>
-            <a:r>
-              <a:rPr lang="es-MX" b="1" dirty="0" err="1"/>
-              <a:t>Customización</a:t>
-            </a:r>
-            <a:r>
-              <a:rPr lang="es-MX" b="1" dirty="0"/>
-              <a:t> del modelo</a:t>
-            </a:r>
-            <a:r>
-              <a:rPr lang="es-MX" dirty="0"/>
-              <a:t>: Introducir arquitecturas alternativas para las torres (</a:t>
-            </a:r>
-            <a:r>
-              <a:rPr lang="es-MX" dirty="0" err="1"/>
-              <a:t>e.g</a:t>
-            </a:r>
-            <a:r>
-              <a:rPr lang="es-MX" dirty="0"/>
-              <a:t>., incluir capas convolucionales o recurrentes).</a:t>
-            </a:r>
-            <a:r>
-              <a:rPr lang="es-MX" b="1" dirty="0"/>
-              <a:t>Inclusión de más datos contextuales</a:t>
-            </a:r>
-            <a:r>
-              <a:rPr lang="es-MX" dirty="0"/>
-              <a:t>: Incorporar información temporal o contextual para enriquecer las recomendaciones.</a:t>
-            </a:r>
-            <a:endParaRPr lang="es-CL" dirty="0"/>
-          </a:p>
-          <a:p>
-            <a:pPr marL="0" lvl="0" indent="0" algn="l" rtl="0">
-              <a:spcBef>
-                <a:spcPts val="0"/>
-              </a:spcBef>
-              <a:spcAft>
-                <a:spcPts val="0"/>
-              </a:spcAft>
-              <a:buNone/>
-            </a:pPr>
-            <a:endParaRPr lang="es-CL" dirty="0"/>
-          </a:p>
-          <a:p>
-            <a:pPr marL="0" lvl="0" indent="0" algn="l" rtl="0">
-              <a:spcBef>
-                <a:spcPts val="0"/>
-              </a:spcBef>
-              <a:spcAft>
-                <a:spcPts val="0"/>
-              </a:spcAft>
-              <a:buNone/>
-            </a:pPr>
-            <a:endParaRPr lang="es-CL" dirty="0"/>
-          </a:p>
-          <a:p>
-            <a:pPr marL="0" lvl="0" indent="0" algn="l" rtl="0">
-              <a:spcBef>
-                <a:spcPts val="0"/>
-              </a:spcBef>
-              <a:spcAft>
-                <a:spcPts val="0"/>
-              </a:spcAft>
-              <a:buNone/>
-            </a:pPr>
-            <a:endParaRPr lang="es-CL" dirty="0"/>
-          </a:p>
-          <a:p>
-            <a:pPr marL="0" lvl="0" indent="0" algn="l" rtl="0">
-              <a:spcBef>
-                <a:spcPts val="0"/>
-              </a:spcBef>
-              <a:spcAft>
-                <a:spcPts val="0"/>
-              </a:spcAft>
-              <a:buNone/>
-            </a:pPr>
-            <a:endParaRPr dirty="0"/>
-          </a:p>
-        </p:txBody>
-      </p:sp>
-      <p:sp>
-        <p:nvSpPr>
-          <p:cNvPr id="68" name="Google Shape;68;g2fdea72edd2_0_58:notes">
-            <a:extLst>
-              <a:ext uri="{FF2B5EF4-FFF2-40B4-BE49-F238E27FC236}">
-                <a16:creationId xmlns:a16="http://schemas.microsoft.com/office/drawing/2014/main" id="{0C1EB308-DE8E-6045-3CEE-9335AF4FCC02}"/>
-              </a:ext>
-            </a:extLst>
-          </p:cNvPr>
-          <p:cNvSpPr txBox="1">
-            <a:spLocks noGrp="1"/>
-          </p:cNvSpPr>
-          <p:nvPr>
-            <p:ph type="sldNum" idx="12"/>
-          </p:nvPr>
-        </p:nvSpPr>
-        <p:spPr>
-          <a:xfrm>
-            <a:off x="3884613" y="8685213"/>
-            <a:ext cx="2971800" cy="458700"/>
-          </a:xfrm>
-          <a:prstGeom prst="rect">
-            <a:avLst/>
-          </a:prstGeom>
-          <a:noFill/>
-          <a:ln>
-            <a:noFill/>
-          </a:ln>
-        </p:spPr>
-        <p:txBody>
-          <a:bodyPr spcFirstLastPara="1" wrap="square" lIns="91425" tIns="45700" rIns="91425" bIns="45700" anchor="b" anchorCtr="0">
-            <a:noAutofit/>
-          </a:bodyPr>
-          <a:lstStyle/>
-          <a:p>
-            <a:pPr marL="0" marR="0" lvl="0" indent="0" algn="r" rtl="0">
-              <a:lnSpc>
-                <a:spcPct val="100000"/>
-              </a:lnSpc>
-              <a:spcBef>
-                <a:spcPts val="0"/>
-              </a:spcBef>
-              <a:spcAft>
-                <a:spcPts val="0"/>
-              </a:spcAft>
-              <a:buClr>
-                <a:srgbClr val="000000"/>
-              </a:buClr>
-              <a:buSzPts val="1200"/>
-              <a:buFont typeface="Calibri"/>
-              <a:buNone/>
-            </a:pPr>
-            <a:fld id="{00000000-1234-1234-1234-123412341234}" type="slidenum">
-              <a:rPr lang="es-419" sz="1200" b="0" i="0" u="none" strike="noStrike" cap="none">
-                <a:solidFill>
-                  <a:srgbClr val="000000"/>
-                </a:solidFill>
-                <a:latin typeface="Calibri"/>
-                <a:ea typeface="Calibri"/>
-                <a:cs typeface="Calibri"/>
-                <a:sym typeface="Calibri"/>
-              </a:rPr>
-              <a:t>15</a:t>
-            </a:fld>
-            <a:endParaRPr sz="1200" b="0" i="0" u="none" strike="noStrike" cap="none">
-              <a:solidFill>
-                <a:srgbClr val="000000"/>
-              </a:solidFill>
-              <a:latin typeface="Calibri"/>
-              <a:ea typeface="Calibri"/>
-              <a:cs typeface="Calibri"/>
-              <a:sym typeface="Calibri"/>
-            </a:endParaRPr>
-          </a:p>
-        </p:txBody>
-      </p:sp>
-    </p:spTree>
-    <p:extLst>
-      <p:ext uri="{BB962C8B-B14F-4D97-AF65-F5344CB8AC3E}">
-        <p14:creationId xmlns:p14="http://schemas.microsoft.com/office/powerpoint/2010/main" val="2299779072"/>
-      </p:ext>
-    </p:extLst>
-  </p:cSld>
-  <p:clrMapOvr>
-    <a:masterClrMapping/>
-  </p:clrMapOvr>
-</p:notes>
-</file>
-
-<file path=ppt/notesSlides/notesSlide16.xml><?xml version="1.0" encoding="utf-8"?>
 <p:notes xmlns:a="http://schemas.openxmlformats.org/drawingml/2006/main" xmlns:r="http://schemas.openxmlformats.org/officeDocument/2006/relationships" xmlns:p="http://schemas.openxmlformats.org/presentationml/2006/main" showMasterSp="0" showMasterPhAnim="0">
   <p:cSld>
     <p:spTree>
@@ -12980,10 +12394,10 @@
       </p:sp>
       <p:pic>
         <p:nvPicPr>
-          <p:cNvPr id="3" name="Imagen 2">
+          <p:cNvPr id="4" name="Imagen 3">
             <a:extLst>
               <a:ext uri="{FF2B5EF4-FFF2-40B4-BE49-F238E27FC236}">
-                <a16:creationId xmlns:a16="http://schemas.microsoft.com/office/drawing/2014/main" id="{1991F360-3AD8-6EA0-0EC8-BD36F8C1B37C}"/>
+                <a16:creationId xmlns:a16="http://schemas.microsoft.com/office/drawing/2014/main" id="{6F676AB3-4FD4-6E18-03E7-1096B7096320}"/>
               </a:ext>
             </a:extLst>
           </p:cNvPr>
@@ -13000,8 +12414,8 @@
         </p:blipFill>
         <p:spPr>
           <a:xfrm>
-            <a:off x="1988664" y="593260"/>
-            <a:ext cx="5540118" cy="2369939"/>
+            <a:off x="1728715" y="604858"/>
+            <a:ext cx="5906525" cy="2448005"/>
           </a:xfrm>
           <a:prstGeom prst="rect">
             <a:avLst/>
@@ -13010,10 +12424,10 @@
       </p:pic>
       <p:pic>
         <p:nvPicPr>
-          <p:cNvPr id="5" name="Imagen 4">
+          <p:cNvPr id="7" name="Imagen 6">
             <a:extLst>
               <a:ext uri="{FF2B5EF4-FFF2-40B4-BE49-F238E27FC236}">
-                <a16:creationId xmlns:a16="http://schemas.microsoft.com/office/drawing/2014/main" id="{D82A13CB-153B-5A4D-BE32-AE2C422F7DE6}"/>
+                <a16:creationId xmlns:a16="http://schemas.microsoft.com/office/drawing/2014/main" id="{B7D242C1-5DCB-FADA-9E11-20574CD7FDCB}"/>
               </a:ext>
             </a:extLst>
           </p:cNvPr>
@@ -13030,8 +12444,8 @@
         </p:blipFill>
         <p:spPr>
           <a:xfrm>
-            <a:off x="2886249" y="2872596"/>
-            <a:ext cx="3371501" cy="2203739"/>
+            <a:off x="3015993" y="2999230"/>
+            <a:ext cx="3112013" cy="2077105"/>
           </a:xfrm>
           <a:prstGeom prst="rect">
             <a:avLst/>
@@ -13052,6 +12466,288 @@
 </file>
 
 <file path=ppt/slides/slide12.xml><?xml version="1.0" encoding="utf-8"?>
+<p:sld xmlns:a="http://schemas.openxmlformats.org/drawingml/2006/main" xmlns:r="http://schemas.openxmlformats.org/officeDocument/2006/relationships" xmlns:p="http://schemas.openxmlformats.org/presentationml/2006/main">
+  <p:cSld>
+    <p:spTree>
+      <p:nvGrpSpPr>
+        <p:cNvPr id="1" name="Shape 69">
+          <a:extLst>
+            <a:ext uri="{FF2B5EF4-FFF2-40B4-BE49-F238E27FC236}">
+              <a16:creationId xmlns:a16="http://schemas.microsoft.com/office/drawing/2014/main" id="{8CCEED10-19E7-D2F6-222D-2B45BAF0F488}"/>
+            </a:ext>
+          </a:extLst>
+        </p:cNvPr>
+        <p:cNvGrpSpPr/>
+        <p:nvPr/>
+      </p:nvGrpSpPr>
+      <p:grpSpPr>
+        <a:xfrm>
+          <a:off x="0" y="0"/>
+          <a:ext cx="0" cy="0"/>
+          <a:chOff x="0" y="0"/>
+          <a:chExt cx="0" cy="0"/>
+        </a:xfrm>
+      </p:grpSpPr>
+      <p:pic>
+        <p:nvPicPr>
+          <p:cNvPr id="70" name="Google Shape;70;p14">
+            <a:extLst>
+              <a:ext uri="{FF2B5EF4-FFF2-40B4-BE49-F238E27FC236}">
+                <a16:creationId xmlns:a16="http://schemas.microsoft.com/office/drawing/2014/main" id="{4C8B4AC4-4E1A-FE9E-A0A9-630F0C2E9399}"/>
+              </a:ext>
+            </a:extLst>
+          </p:cNvPr>
+          <p:cNvPicPr preferRelativeResize="0"/>
+          <p:nvPr/>
+        </p:nvPicPr>
+        <p:blipFill rotWithShape="1">
+          <a:blip r:embed="rId3">
+            <a:alphaModFix/>
+          </a:blip>
+          <a:srcRect l="-150" t="20538" r="150" b="51650"/>
+          <a:stretch/>
+        </p:blipFill>
+        <p:spPr>
+          <a:xfrm>
+            <a:off x="-14013" y="-8905"/>
+            <a:ext cx="9172027" cy="602165"/>
+          </a:xfrm>
+          <a:prstGeom prst="rect">
+            <a:avLst/>
+          </a:prstGeom>
+          <a:noFill/>
+          <a:ln>
+            <a:noFill/>
+          </a:ln>
+        </p:spPr>
+      </p:pic>
+      <p:pic>
+        <p:nvPicPr>
+          <p:cNvPr id="71" name="Google Shape;71;p14">
+            <a:extLst>
+              <a:ext uri="{FF2B5EF4-FFF2-40B4-BE49-F238E27FC236}">
+                <a16:creationId xmlns:a16="http://schemas.microsoft.com/office/drawing/2014/main" id="{5D4B2577-7327-AC84-29A9-387BE8E54DEB}"/>
+              </a:ext>
+            </a:extLst>
+          </p:cNvPr>
+          <p:cNvPicPr preferRelativeResize="0"/>
+          <p:nvPr/>
+        </p:nvPicPr>
+        <p:blipFill rotWithShape="1">
+          <a:blip r:embed="rId4">
+            <a:alphaModFix/>
+          </a:blip>
+          <a:srcRect/>
+          <a:stretch/>
+        </p:blipFill>
+        <p:spPr>
+          <a:xfrm>
+            <a:off x="8316024" y="67165"/>
+            <a:ext cx="539441" cy="450022"/>
+          </a:xfrm>
+          <a:prstGeom prst="rect">
+            <a:avLst/>
+          </a:prstGeom>
+          <a:noFill/>
+          <a:ln>
+            <a:noFill/>
+          </a:ln>
+        </p:spPr>
+      </p:pic>
+      <p:sp>
+        <p:nvSpPr>
+          <p:cNvPr id="72" name="Google Shape;72;p14">
+            <a:extLst>
+              <a:ext uri="{FF2B5EF4-FFF2-40B4-BE49-F238E27FC236}">
+                <a16:creationId xmlns:a16="http://schemas.microsoft.com/office/drawing/2014/main" id="{BAE45245-F931-1911-AADF-8285E11307BB}"/>
+              </a:ext>
+            </a:extLst>
+          </p:cNvPr>
+          <p:cNvSpPr txBox="1"/>
+          <p:nvPr/>
+        </p:nvSpPr>
+        <p:spPr>
+          <a:xfrm>
+            <a:off x="65921" y="67165"/>
+            <a:ext cx="7804500" cy="461624"/>
+          </a:xfrm>
+          <a:prstGeom prst="rect">
+            <a:avLst/>
+          </a:prstGeom>
+          <a:noFill/>
+          <a:ln>
+            <a:noFill/>
+          </a:ln>
+        </p:spPr>
+        <p:txBody>
+          <a:bodyPr spcFirstLastPara="1" wrap="square" lIns="91425" tIns="45700" rIns="91425" bIns="45700" anchor="t" anchorCtr="0">
+            <a:spAutoFit/>
+          </a:bodyPr>
+          <a:lstStyle/>
+          <a:p>
+            <a:pPr marL="0" marR="0" lvl="0" indent="0" algn="l" rtl="0">
+              <a:lnSpc>
+                <a:spcPct val="100000"/>
+              </a:lnSpc>
+              <a:spcBef>
+                <a:spcPts val="0"/>
+              </a:spcBef>
+              <a:spcAft>
+                <a:spcPts val="0"/>
+              </a:spcAft>
+              <a:buClr>
+                <a:srgbClr val="FFFFFF"/>
+              </a:buClr>
+              <a:buSzPts val="2400"/>
+              <a:buFont typeface="Helvetica Neue"/>
+              <a:buNone/>
+            </a:pPr>
+            <a:r>
+              <a:rPr lang="es-419" sz="2400" b="1" i="0" u="none" strike="noStrike" cap="none" dirty="0">
+                <a:solidFill>
+                  <a:srgbClr val="FFFFFF"/>
+                </a:solidFill>
+                <a:latin typeface="+mj-lt"/>
+                <a:ea typeface="Helvetica Neue"/>
+                <a:cs typeface="Helvetica Neue"/>
+                <a:sym typeface="Helvetica Neue"/>
+              </a:rPr>
+              <a:t>Resultados</a:t>
+            </a:r>
+            <a:endParaRPr sz="1200" b="1" i="0" u="none" strike="noStrike" cap="none" dirty="0">
+              <a:solidFill>
+                <a:srgbClr val="FFFFFF"/>
+              </a:solidFill>
+              <a:latin typeface="+mj-lt"/>
+              <a:ea typeface="Helvetica Neue"/>
+              <a:cs typeface="Helvetica Neue"/>
+              <a:sym typeface="Helvetica Neue"/>
+            </a:endParaRPr>
+          </a:p>
+        </p:txBody>
+      </p:sp>
+      <p:sp>
+        <p:nvSpPr>
+          <p:cNvPr id="73" name="Google Shape;73;p14">
+            <a:extLst>
+              <a:ext uri="{FF2B5EF4-FFF2-40B4-BE49-F238E27FC236}">
+                <a16:creationId xmlns:a16="http://schemas.microsoft.com/office/drawing/2014/main" id="{C4C3125F-DECF-7E4E-617F-C0D761E19F9E}"/>
+              </a:ext>
+            </a:extLst>
+          </p:cNvPr>
+          <p:cNvSpPr txBox="1">
+            <a:spLocks noGrp="1"/>
+          </p:cNvSpPr>
+          <p:nvPr>
+            <p:ph type="sldNum" idx="12"/>
+          </p:nvPr>
+        </p:nvSpPr>
+        <p:spPr>
+          <a:xfrm>
+            <a:off x="8472458" y="4663217"/>
+            <a:ext cx="548700" cy="393600"/>
+          </a:xfrm>
+          <a:prstGeom prst="rect">
+            <a:avLst/>
+          </a:prstGeom>
+        </p:spPr>
+        <p:txBody>
+          <a:bodyPr spcFirstLastPara="1" wrap="square" lIns="91425" tIns="91425" rIns="91425" bIns="91425" anchor="ctr" anchorCtr="0">
+            <a:normAutofit/>
+          </a:bodyPr>
+          <a:lstStyle/>
+          <a:p>
+            <a:pPr marL="0" lvl="0" indent="0" algn="r" rtl="0">
+              <a:spcBef>
+                <a:spcPts val="0"/>
+              </a:spcBef>
+              <a:spcAft>
+                <a:spcPts val="0"/>
+              </a:spcAft>
+              <a:buNone/>
+            </a:pPr>
+            <a:fld id="{00000000-1234-1234-1234-123412341234}" type="slidenum">
+              <a:rPr lang="es-419"/>
+              <a:t>12</a:t>
+            </a:fld>
+            <a:endParaRPr/>
+          </a:p>
+        </p:txBody>
+      </p:sp>
+      <p:pic>
+        <p:nvPicPr>
+          <p:cNvPr id="4" name="Imagen 3">
+            <a:extLst>
+              <a:ext uri="{FF2B5EF4-FFF2-40B4-BE49-F238E27FC236}">
+                <a16:creationId xmlns:a16="http://schemas.microsoft.com/office/drawing/2014/main" id="{B3D1B150-E8CA-1DBE-E62C-481225995165}"/>
+              </a:ext>
+            </a:extLst>
+          </p:cNvPr>
+          <p:cNvPicPr>
+            <a:picLocks noChangeAspect="1"/>
+          </p:cNvPicPr>
+          <p:nvPr/>
+        </p:nvPicPr>
+        <p:blipFill>
+          <a:blip r:embed="rId5"/>
+          <a:stretch>
+            <a:fillRect/>
+          </a:stretch>
+        </p:blipFill>
+        <p:spPr>
+          <a:xfrm>
+            <a:off x="1280160" y="947095"/>
+            <a:ext cx="6338751" cy="2053250"/>
+          </a:xfrm>
+          <a:prstGeom prst="rect">
+            <a:avLst/>
+          </a:prstGeom>
+        </p:spPr>
+      </p:pic>
+      <p:pic>
+        <p:nvPicPr>
+          <p:cNvPr id="7" name="Imagen 6">
+            <a:extLst>
+              <a:ext uri="{FF2B5EF4-FFF2-40B4-BE49-F238E27FC236}">
+                <a16:creationId xmlns:a16="http://schemas.microsoft.com/office/drawing/2014/main" id="{1D2AE0FA-B5FD-07D0-4F76-DF1E9FB5B346}"/>
+              </a:ext>
+            </a:extLst>
+          </p:cNvPr>
+          <p:cNvPicPr>
+            <a:picLocks noChangeAspect="1"/>
+          </p:cNvPicPr>
+          <p:nvPr/>
+        </p:nvPicPr>
+        <p:blipFill>
+          <a:blip r:embed="rId6"/>
+          <a:stretch>
+            <a:fillRect/>
+          </a:stretch>
+        </p:blipFill>
+        <p:spPr>
+          <a:xfrm>
+            <a:off x="1280160" y="3050629"/>
+            <a:ext cx="6338751" cy="2019700"/>
+          </a:xfrm>
+          <a:prstGeom prst="rect">
+            <a:avLst/>
+          </a:prstGeom>
+        </p:spPr>
+      </p:pic>
+    </p:spTree>
+    <p:extLst>
+      <p:ext uri="{BB962C8B-B14F-4D97-AF65-F5344CB8AC3E}">
+        <p14:creationId xmlns:p14="http://schemas.microsoft.com/office/powerpoint/2010/main" val="816971613"/>
+      </p:ext>
+    </p:extLst>
+  </p:cSld>
+  <p:clrMapOvr>
+    <a:masterClrMapping/>
+  </p:clrMapOvr>
+</p:sld>
+</file>
+
+<file path=ppt/slides/slide13.xml><?xml version="1.0" encoding="utf-8"?>
 <p:sld xmlns:a="http://schemas.openxmlformats.org/drawingml/2006/main" xmlns:r="http://schemas.openxmlformats.org/officeDocument/2006/relationships" xmlns:p="http://schemas.openxmlformats.org/presentationml/2006/main">
   <p:cSld>
     <p:spTree>
@@ -13254,228 +12950,6 @@
             </a:pPr>
             <a:fld id="{00000000-1234-1234-1234-123412341234}" type="slidenum">
               <a:rPr lang="es-419"/>
-              <a:t>12</a:t>
-            </a:fld>
-            <a:endParaRPr/>
-          </a:p>
-        </p:txBody>
-      </p:sp>
-    </p:spTree>
-    <p:extLst>
-      <p:ext uri="{BB962C8B-B14F-4D97-AF65-F5344CB8AC3E}">
-        <p14:creationId xmlns:p14="http://schemas.microsoft.com/office/powerpoint/2010/main" val="1455484933"/>
-      </p:ext>
-    </p:extLst>
-  </p:cSld>
-  <p:clrMapOvr>
-    <a:masterClrMapping/>
-  </p:clrMapOvr>
-</p:sld>
-</file>
-
-<file path=ppt/slides/slide13.xml><?xml version="1.0" encoding="utf-8"?>
-<p:sld xmlns:a="http://schemas.openxmlformats.org/drawingml/2006/main" xmlns:r="http://schemas.openxmlformats.org/officeDocument/2006/relationships" xmlns:p="http://schemas.openxmlformats.org/presentationml/2006/main">
-  <p:cSld>
-    <p:spTree>
-      <p:nvGrpSpPr>
-        <p:cNvPr id="1" name="Shape 69">
-          <a:extLst>
-            <a:ext uri="{FF2B5EF4-FFF2-40B4-BE49-F238E27FC236}">
-              <a16:creationId xmlns:a16="http://schemas.microsoft.com/office/drawing/2014/main" id="{4D14E996-5EB2-9DFA-6594-AD67D85BCC1F}"/>
-            </a:ext>
-          </a:extLst>
-        </p:cNvPr>
-        <p:cNvGrpSpPr/>
-        <p:nvPr/>
-      </p:nvGrpSpPr>
-      <p:grpSpPr>
-        <a:xfrm>
-          <a:off x="0" y="0"/>
-          <a:ext cx="0" cy="0"/>
-          <a:chOff x="0" y="0"/>
-          <a:chExt cx="0" cy="0"/>
-        </a:xfrm>
-      </p:grpSpPr>
-      <p:pic>
-        <p:nvPicPr>
-          <p:cNvPr id="70" name="Google Shape;70;p14">
-            <a:extLst>
-              <a:ext uri="{FF2B5EF4-FFF2-40B4-BE49-F238E27FC236}">
-                <a16:creationId xmlns:a16="http://schemas.microsoft.com/office/drawing/2014/main" id="{179BDFE2-D513-6DF7-E6B9-995128B3CA18}"/>
-              </a:ext>
-            </a:extLst>
-          </p:cNvPr>
-          <p:cNvPicPr preferRelativeResize="0"/>
-          <p:nvPr/>
-        </p:nvPicPr>
-        <p:blipFill rotWithShape="1">
-          <a:blip r:embed="rId3">
-            <a:alphaModFix/>
-          </a:blip>
-          <a:srcRect l="-150" t="20538" r="150" b="51650"/>
-          <a:stretch/>
-        </p:blipFill>
-        <p:spPr>
-          <a:xfrm>
-            <a:off x="-14013" y="-8905"/>
-            <a:ext cx="9172027" cy="602165"/>
-          </a:xfrm>
-          <a:prstGeom prst="rect">
-            <a:avLst/>
-          </a:prstGeom>
-          <a:noFill/>
-          <a:ln>
-            <a:noFill/>
-          </a:ln>
-        </p:spPr>
-      </p:pic>
-      <p:pic>
-        <p:nvPicPr>
-          <p:cNvPr id="71" name="Google Shape;71;p14">
-            <a:extLst>
-              <a:ext uri="{FF2B5EF4-FFF2-40B4-BE49-F238E27FC236}">
-                <a16:creationId xmlns:a16="http://schemas.microsoft.com/office/drawing/2014/main" id="{EB3CDD66-B68E-4780-2EBB-857F8123EA34}"/>
-              </a:ext>
-            </a:extLst>
-          </p:cNvPr>
-          <p:cNvPicPr preferRelativeResize="0"/>
-          <p:nvPr/>
-        </p:nvPicPr>
-        <p:blipFill rotWithShape="1">
-          <a:blip r:embed="rId4">
-            <a:alphaModFix/>
-          </a:blip>
-          <a:srcRect/>
-          <a:stretch/>
-        </p:blipFill>
-        <p:spPr>
-          <a:xfrm>
-            <a:off x="8316024" y="67165"/>
-            <a:ext cx="539441" cy="450022"/>
-          </a:xfrm>
-          <a:prstGeom prst="rect">
-            <a:avLst/>
-          </a:prstGeom>
-          <a:noFill/>
-          <a:ln>
-            <a:noFill/>
-          </a:ln>
-        </p:spPr>
-      </p:pic>
-      <p:sp>
-        <p:nvSpPr>
-          <p:cNvPr id="72" name="Google Shape;72;p14">
-            <a:extLst>
-              <a:ext uri="{FF2B5EF4-FFF2-40B4-BE49-F238E27FC236}">
-                <a16:creationId xmlns:a16="http://schemas.microsoft.com/office/drawing/2014/main" id="{CC76DE93-895B-235F-4306-A0CBA17A8E14}"/>
-              </a:ext>
-            </a:extLst>
-          </p:cNvPr>
-          <p:cNvSpPr txBox="1"/>
-          <p:nvPr/>
-        </p:nvSpPr>
-        <p:spPr>
-          <a:xfrm>
-            <a:off x="65921" y="67165"/>
-            <a:ext cx="7804500" cy="461624"/>
-          </a:xfrm>
-          <a:prstGeom prst="rect">
-            <a:avLst/>
-          </a:prstGeom>
-          <a:noFill/>
-          <a:ln>
-            <a:noFill/>
-          </a:ln>
-        </p:spPr>
-        <p:txBody>
-          <a:bodyPr spcFirstLastPara="1" wrap="square" lIns="91425" tIns="45700" rIns="91425" bIns="45700" anchor="t" anchorCtr="0">
-            <a:spAutoFit/>
-          </a:bodyPr>
-          <a:lstStyle/>
-          <a:p>
-            <a:pPr marL="0" marR="0" lvl="0" indent="0" algn="l" rtl="0">
-              <a:lnSpc>
-                <a:spcPct val="100000"/>
-              </a:lnSpc>
-              <a:spcBef>
-                <a:spcPts val="0"/>
-              </a:spcBef>
-              <a:spcAft>
-                <a:spcPts val="0"/>
-              </a:spcAft>
-              <a:buClr>
-                <a:srgbClr val="FFFFFF"/>
-              </a:buClr>
-              <a:buSzPts val="2400"/>
-              <a:buFont typeface="Helvetica Neue"/>
-              <a:buNone/>
-            </a:pPr>
-            <a:r>
-              <a:rPr lang="es-419" sz="2400" b="1" i="0" u="none" strike="noStrike" cap="none" dirty="0">
-                <a:solidFill>
-                  <a:srgbClr val="FFFFFF"/>
-                </a:solidFill>
-                <a:latin typeface="+mj-lt"/>
-                <a:ea typeface="Helvetica Neue"/>
-                <a:cs typeface="Helvetica Neue"/>
-                <a:sym typeface="Helvetica Neue"/>
-              </a:rPr>
-              <a:t>Resultados</a:t>
-            </a:r>
-            <a:endParaRPr sz="1200" b="1" i="0" u="none" strike="noStrike" cap="none" dirty="0">
-              <a:solidFill>
-                <a:srgbClr val="FFFFFF"/>
-              </a:solidFill>
-              <a:latin typeface="+mj-lt"/>
-              <a:ea typeface="Helvetica Neue"/>
-              <a:cs typeface="Helvetica Neue"/>
-              <a:sym typeface="Helvetica Neue"/>
-            </a:endParaRPr>
-          </a:p>
-        </p:txBody>
-      </p:sp>
-      <p:sp>
-        <p:nvSpPr>
-          <p:cNvPr id="73" name="Google Shape;73;p14">
-            <a:extLst>
-              <a:ext uri="{FF2B5EF4-FFF2-40B4-BE49-F238E27FC236}">
-                <a16:creationId xmlns:a16="http://schemas.microsoft.com/office/drawing/2014/main" id="{DAED00BB-470A-24E1-FE6F-E963C3C5C5EF}"/>
-              </a:ext>
-            </a:extLst>
-          </p:cNvPr>
-          <p:cNvSpPr txBox="1">
-            <a:spLocks noGrp="1"/>
-          </p:cNvSpPr>
-          <p:nvPr>
-            <p:ph type="sldNum" idx="12"/>
-          </p:nvPr>
-        </p:nvSpPr>
-        <p:spPr>
-          <a:xfrm>
-            <a:off x="8472458" y="4663217"/>
-            <a:ext cx="548700" cy="393600"/>
-          </a:xfrm>
-          <a:prstGeom prst="rect">
-            <a:avLst/>
-          </a:prstGeom>
-        </p:spPr>
-        <p:txBody>
-          <a:bodyPr spcFirstLastPara="1" wrap="square" lIns="91425" tIns="91425" rIns="91425" bIns="91425" anchor="ctr" anchorCtr="0">
-            <a:normAutofit/>
-          </a:bodyPr>
-          <a:lstStyle/>
-          <a:p>
-            <a:pPr marL="0" lvl="0" indent="0" algn="r" rtl="0">
-              <a:spcBef>
-                <a:spcPts val="0"/>
-              </a:spcBef>
-              <a:spcAft>
-                <a:spcPts val="0"/>
-              </a:spcAft>
-              <a:buNone/>
-            </a:pPr>
-            <a:fld id="{00000000-1234-1234-1234-123412341234}" type="slidenum">
-              <a:rPr lang="es-419"/>
               <a:t>13</a:t>
             </a:fld>
             <a:endParaRPr/>
@@ -13487,7 +12961,7 @@
           <p:cNvPr id="3" name="Imagen 2">
             <a:extLst>
               <a:ext uri="{FF2B5EF4-FFF2-40B4-BE49-F238E27FC236}">
-                <a16:creationId xmlns:a16="http://schemas.microsoft.com/office/drawing/2014/main" id="{45D19456-EE05-8236-6DB4-950541048FED}"/>
+                <a16:creationId xmlns:a16="http://schemas.microsoft.com/office/drawing/2014/main" id="{EB3DEAF6-43BD-4233-6AC8-C01BADEDC7D9}"/>
               </a:ext>
             </a:extLst>
           </p:cNvPr>
@@ -13498,14 +12972,13 @@
         </p:nvPicPr>
         <p:blipFill>
           <a:blip r:embed="rId5"/>
-          <a:stretch>
-            <a:fillRect/>
-          </a:stretch>
+          <a:srcRect l="3799" r="6339"/>
+          <a:stretch/>
         </p:blipFill>
         <p:spPr>
           <a:xfrm>
-            <a:off x="2423158" y="3493545"/>
-            <a:ext cx="4297681" cy="1409668"/>
+            <a:off x="1622127" y="604859"/>
+            <a:ext cx="5899746" cy="2103586"/>
           </a:xfrm>
           <a:prstGeom prst="rect">
             <a:avLst/>
@@ -13514,10 +12987,10 @@
       </p:pic>
       <p:pic>
         <p:nvPicPr>
-          <p:cNvPr id="4" name="Imagen 3">
+          <p:cNvPr id="5" name="Imagen 4">
             <a:extLst>
               <a:ext uri="{FF2B5EF4-FFF2-40B4-BE49-F238E27FC236}">
-                <a16:creationId xmlns:a16="http://schemas.microsoft.com/office/drawing/2014/main" id="{AE1E27EF-7672-DC77-9806-C23EA46F1588}"/>
+                <a16:creationId xmlns:a16="http://schemas.microsoft.com/office/drawing/2014/main" id="{2D746F50-654E-6BDE-CA71-4A5C20FCBE62}"/>
               </a:ext>
             </a:extLst>
           </p:cNvPr>
@@ -13527,45 +13000,14 @@
           <p:nvPr/>
         </p:nvPicPr>
         <p:blipFill>
-          <a:blip r:embed="rId5"/>
-          <a:stretch>
-            <a:fillRect/>
-          </a:stretch>
+          <a:blip r:embed="rId6"/>
+          <a:srcRect l="4056" r="4056"/>
+          <a:stretch/>
         </p:blipFill>
         <p:spPr>
           <a:xfrm>
-            <a:off x="2423159" y="2048702"/>
-            <a:ext cx="4297681" cy="1409668"/>
-          </a:xfrm>
-          <a:prstGeom prst="rect">
-            <a:avLst/>
-          </a:prstGeom>
-        </p:spPr>
-      </p:pic>
-      <p:pic>
-        <p:nvPicPr>
-          <p:cNvPr id="5" name="Imagen 4">
-            <a:extLst>
-              <a:ext uri="{FF2B5EF4-FFF2-40B4-BE49-F238E27FC236}">
-                <a16:creationId xmlns:a16="http://schemas.microsoft.com/office/drawing/2014/main" id="{207D1FFF-3380-AE1B-689F-DB1F6598F7E6}"/>
-              </a:ext>
-            </a:extLst>
-          </p:cNvPr>
-          <p:cNvPicPr>
-            <a:picLocks noChangeAspect="1"/>
-          </p:cNvPicPr>
-          <p:nvPr/>
-        </p:nvPicPr>
-        <p:blipFill>
-          <a:blip r:embed="rId5"/>
-          <a:stretch>
-            <a:fillRect/>
-          </a:stretch>
-        </p:blipFill>
-        <p:spPr>
-          <a:xfrm>
-            <a:off x="2423159" y="603859"/>
-            <a:ext cx="4297681" cy="1409668"/>
+            <a:off x="1622127" y="2829392"/>
+            <a:ext cx="5899746" cy="1902137"/>
           </a:xfrm>
           <a:prstGeom prst="rect">
             <a:avLst/>
@@ -13575,7 +13017,7 @@
     </p:spTree>
     <p:extLst>
       <p:ext uri="{BB962C8B-B14F-4D97-AF65-F5344CB8AC3E}">
-        <p14:creationId xmlns:p14="http://schemas.microsoft.com/office/powerpoint/2010/main" val="2815478043"/>
+        <p14:creationId xmlns:p14="http://schemas.microsoft.com/office/powerpoint/2010/main" val="1455484933"/>
       </p:ext>
     </p:extLst>
   </p:cSld>
@@ -13808,8 +13250,8 @@
         </p:nvSpPr>
         <p:spPr>
           <a:xfrm>
-            <a:off x="515385" y="745575"/>
-            <a:ext cx="7879284" cy="2462213"/>
+            <a:off x="745583" y="817424"/>
+            <a:ext cx="7652833" cy="1754326"/>
           </a:xfrm>
           <a:prstGeom prst="rect">
             <a:avLst/>
@@ -13827,7 +13269,7 @@
               <a:buChar char="Ø"/>
             </a:pPr>
             <a:r>
-              <a:rPr lang="es-MX" sz="1100" dirty="0"/>
+              <a:rPr lang="es-MX" sz="900" dirty="0"/>
               <a:t>La arquitectura modular permite probar variaciones en las torres de usuarios e ítems, adaptándose a diferentes escenarios y necesidades.</a:t>
             </a:r>
           </a:p>
@@ -13836,7 +13278,7 @@
               <a:buFont typeface="Wingdings" panose="05000000000000000000" pitchFamily="2" charset="2"/>
               <a:buChar char="Ø"/>
             </a:pPr>
-            <a:endParaRPr lang="es-MX" sz="1100" dirty="0"/>
+            <a:endParaRPr lang="es-MX" sz="900" dirty="0"/>
           </a:p>
           <a:p>
             <a:pPr marL="171450" indent="-171450" algn="just">
@@ -13844,7 +13286,7 @@
               <a:buChar char="Ø"/>
             </a:pPr>
             <a:r>
-              <a:rPr lang="es-MX" sz="1100" dirty="0"/>
+              <a:rPr lang="es-MX" sz="900" dirty="0"/>
               <a:t>Los modelos integran métricas clave como Precision@k, Recall@k y NDCG@k para evaluar la calidad de las recomendaciones.</a:t>
             </a:r>
           </a:p>
@@ -13853,7 +13295,7 @@
               <a:buFont typeface="Wingdings" panose="05000000000000000000" pitchFamily="2" charset="2"/>
               <a:buChar char="Ø"/>
             </a:pPr>
-            <a:endParaRPr lang="es-MX" sz="1100" dirty="0"/>
+            <a:endParaRPr lang="es-MX" sz="900" dirty="0"/>
           </a:p>
           <a:p>
             <a:pPr marL="171450" indent="-171450" algn="just">
@@ -13861,7 +13303,7 @@
               <a:buChar char="Ø"/>
             </a:pPr>
             <a:r>
-              <a:rPr lang="es-MX" sz="1100" dirty="0"/>
+              <a:rPr lang="es-MX" sz="900" dirty="0"/>
               <a:t>Algunos modelos, como el TwoTowerModelV1 y el TwoTowerModelV3, muestran un buen equilibrio entre precisión y cobertura, indicando que son capaces de realizar recomendaciones relevantes para la mayoría de los usuarios.</a:t>
             </a:r>
           </a:p>
@@ -13870,7 +13312,7 @@
               <a:buFont typeface="Wingdings" panose="05000000000000000000" pitchFamily="2" charset="2"/>
               <a:buChar char="Ø"/>
             </a:pPr>
-            <a:endParaRPr lang="es-MX" sz="1100" dirty="0"/>
+            <a:endParaRPr lang="es-MX" sz="900" dirty="0"/>
           </a:p>
           <a:p>
             <a:pPr marL="171450" indent="-171450" algn="just">
@@ -13878,7 +13320,7 @@
               <a:buChar char="Ø"/>
             </a:pPr>
             <a:r>
-              <a:rPr lang="es-MX" sz="1100" dirty="0"/>
+              <a:rPr lang="es-MX" sz="900" dirty="0"/>
               <a:t>La evaluación general de relevancia (cobertura, novedad y sesgo de popularidad) muestra que el sistema puede cubrir una porción significativa de los ítems disponibles, mientras se esfuerza por reducir el sesgo hacia los ítems populares.</a:t>
             </a:r>
           </a:p>
@@ -13887,7 +13329,7 @@
               <a:buFont typeface="Wingdings" panose="05000000000000000000" pitchFamily="2" charset="2"/>
               <a:buChar char="Ø"/>
             </a:pPr>
-            <a:endParaRPr lang="es-MX" sz="1100" dirty="0"/>
+            <a:endParaRPr lang="es-MX" sz="900" dirty="0"/>
           </a:p>
           <a:p>
             <a:pPr marL="171450" indent="-171450" algn="just">
@@ -13895,109 +13337,256 @@
               <a:buChar char="Ø"/>
             </a:pPr>
             <a:r>
-              <a:rPr lang="es-MX" sz="1100" dirty="0"/>
+              <a:rPr lang="es-MX" sz="900" dirty="0"/>
               <a:t>Modelos como el SparseTwoTowerV3 obtienen métricas de novedad más altas, destacándose por recomendar ítems menos populares y fomentando la diversidad en las recomendaciones.</a:t>
             </a:r>
-            <a:endParaRPr lang="es-MX" sz="900" dirty="0"/>
+            <a:endParaRPr lang="es-MX" sz="600" dirty="0"/>
           </a:p>
         </p:txBody>
       </p:sp>
-      <p:sp>
-        <p:nvSpPr>
-          <p:cNvPr id="3" name="CuadroTexto 2">
+      <p:grpSp>
+        <p:nvGrpSpPr>
+          <p:cNvPr id="5" name="Grupo 4">
             <a:extLst>
               <a:ext uri="{FF2B5EF4-FFF2-40B4-BE49-F238E27FC236}">
-                <a16:creationId xmlns:a16="http://schemas.microsoft.com/office/drawing/2014/main" id="{D952C075-E670-D449-FA0E-1FE7C9EA3137}"/>
+                <a16:creationId xmlns:a16="http://schemas.microsoft.com/office/drawing/2014/main" id="{BD9D2725-25F9-394D-B5B8-BEA2C8B6C51D}"/>
               </a:ext>
             </a:extLst>
           </p:cNvPr>
-          <p:cNvSpPr txBox="1"/>
+          <p:cNvGrpSpPr/>
           <p:nvPr/>
-        </p:nvSpPr>
-        <p:spPr>
-          <a:xfrm>
-            <a:off x="515385" y="3601388"/>
-            <a:ext cx="8113230" cy="1061829"/>
-          </a:xfrm>
-          <a:prstGeom prst="rect">
-            <a:avLst/>
-          </a:prstGeom>
-          <a:noFill/>
-        </p:spPr>
-        <p:txBody>
-          <a:bodyPr wrap="square" rtlCol="0">
-            <a:spAutoFit/>
-          </a:bodyPr>
-          <a:lstStyle/>
-          <a:p>
-            <a:r>
-              <a:rPr lang="es-MX" sz="1050" b="1" dirty="0"/>
-              <a:t>Modelo SparseTwoTower con torres V3</a:t>
-            </a:r>
-            <a:r>
-              <a:rPr lang="es-MX" sz="1050" dirty="0"/>
-              <a:t> </a:t>
-            </a:r>
-            <a:endParaRPr lang="es-MX" sz="1050" b="1" dirty="0"/>
-          </a:p>
-          <a:p>
-            <a:pPr marL="171450" indent="-171450">
-              <a:buFont typeface="Arial" panose="020B0604020202020204" pitchFamily="34" charset="0"/>
-              <a:buChar char="•"/>
-            </a:pPr>
-            <a:r>
-              <a:rPr lang="es-MX" sz="1050" b="1" dirty="0"/>
-              <a:t>Cobertura</a:t>
-            </a:r>
-            <a:r>
-              <a:rPr lang="es-MX" sz="1050" dirty="0"/>
-              <a:t>: Logra una cobertura razonable del 77.36%.</a:t>
-            </a:r>
-          </a:p>
-          <a:p>
-            <a:pPr marL="171450" indent="-171450">
-              <a:buFont typeface="Arial" panose="020B0604020202020204" pitchFamily="34" charset="0"/>
-              <a:buChar char="•"/>
-            </a:pPr>
-            <a:r>
-              <a:rPr lang="es-MX" sz="1050" b="1" dirty="0"/>
-              <a:t>Novedad</a:t>
-            </a:r>
-            <a:r>
-              <a:rPr lang="es-MX" sz="1050" dirty="0"/>
-              <a:t>: Con una puntuación de 1.7603, es capaz de recomendar ítems menos populares.</a:t>
-            </a:r>
-          </a:p>
-          <a:p>
-            <a:pPr marL="171450" indent="-171450">
-              <a:buFont typeface="Arial" panose="020B0604020202020204" pitchFamily="34" charset="0"/>
-              <a:buChar char="•"/>
-            </a:pPr>
-            <a:r>
-              <a:rPr lang="es-MX" sz="1050" b="1" dirty="0"/>
-              <a:t>Precisión y Recall</a:t>
-            </a:r>
-            <a:r>
-              <a:rPr lang="es-MX" sz="1050" dirty="0"/>
-              <a:t>: Aunque no lidera en todas las métricas de precisión y recall, mantiene un rendimiento competitivo (Precision@5: 0.7474 y Recall@5: 0.3791).</a:t>
-            </a:r>
-          </a:p>
-          <a:p>
-            <a:pPr marL="171450" indent="-171450">
-              <a:buFont typeface="Arial" panose="020B0604020202020204" pitchFamily="34" charset="0"/>
-              <a:buChar char="•"/>
-            </a:pPr>
-            <a:r>
-              <a:rPr lang="es-MX" sz="1050" b="1" dirty="0"/>
-              <a:t>Sesgo de Popularidad</a:t>
-            </a:r>
-            <a:r>
-              <a:rPr lang="es-MX" sz="1050" dirty="0"/>
-              <a:t>: Tiene uno de los sesgos más bajos (203.1619), mostrando una preferencia reducida por ítems populares.</a:t>
-            </a:r>
-          </a:p>
-        </p:txBody>
-      </p:sp>
+        </p:nvGrpSpPr>
+        <p:grpSpPr>
+          <a:xfrm>
+            <a:off x="1000128" y="2795914"/>
+            <a:ext cx="7143741" cy="2169825"/>
+            <a:chOff x="1231645" y="2818656"/>
+            <a:chExt cx="7143741" cy="2169825"/>
+          </a:xfrm>
+        </p:grpSpPr>
+        <p:sp>
+          <p:nvSpPr>
+            <p:cNvPr id="2" name="CuadroTexto 1">
+              <a:extLst>
+                <a:ext uri="{FF2B5EF4-FFF2-40B4-BE49-F238E27FC236}">
+                  <a16:creationId xmlns:a16="http://schemas.microsoft.com/office/drawing/2014/main" id="{370B7F3C-C033-0C88-58C6-3A5A05A66D10}"/>
+                </a:ext>
+              </a:extLst>
+            </p:cNvPr>
+            <p:cNvSpPr txBox="1"/>
+            <p:nvPr/>
+          </p:nvSpPr>
+          <p:spPr>
+            <a:xfrm>
+              <a:off x="1231645" y="2818656"/>
+              <a:ext cx="3571871" cy="2169825"/>
+            </a:xfrm>
+            <a:prstGeom prst="rect">
+              <a:avLst/>
+            </a:prstGeom>
+            <a:noFill/>
+          </p:spPr>
+          <p:txBody>
+            <a:bodyPr wrap="square" rtlCol="0">
+              <a:spAutoFit/>
+            </a:bodyPr>
+            <a:lstStyle/>
+            <a:p>
+              <a:r>
+                <a:rPr lang="es-MX" b="1" dirty="0"/>
+                <a:t>Limitaciones</a:t>
+              </a:r>
+            </a:p>
+            <a:p>
+              <a:pPr marL="171450" indent="-171450">
+                <a:buFont typeface="Arial" panose="020B0604020202020204" pitchFamily="34" charset="0"/>
+                <a:buChar char="•"/>
+              </a:pPr>
+              <a:r>
+                <a:rPr lang="es-MX" sz="1100" dirty="0"/>
+                <a:t>Datos</a:t>
+              </a:r>
+            </a:p>
+            <a:p>
+              <a:pPr marL="628650" lvl="1" indent="-171450">
+                <a:buFont typeface="Wingdings" panose="05000000000000000000" pitchFamily="2" charset="2"/>
+                <a:buChar char="Ø"/>
+              </a:pPr>
+              <a:r>
+                <a:rPr lang="es-MX" sz="1100" dirty="0"/>
+                <a:t>Dependencia de los datos de entrenamiento</a:t>
+              </a:r>
+            </a:p>
+            <a:p>
+              <a:pPr marL="628650" lvl="1" indent="-171450">
+                <a:buFont typeface="Wingdings" panose="05000000000000000000" pitchFamily="2" charset="2"/>
+                <a:buChar char="Ø"/>
+              </a:pPr>
+              <a:r>
+                <a:rPr lang="es-CL" sz="1100" dirty="0"/>
+                <a:t>Sesgo hacia ítems populares</a:t>
+              </a:r>
+              <a:endParaRPr lang="es-MX" sz="1100" dirty="0"/>
+            </a:p>
+            <a:p>
+              <a:pPr marL="628650" lvl="1" indent="-171450">
+                <a:buFont typeface="Wingdings" panose="05000000000000000000" pitchFamily="2" charset="2"/>
+                <a:buChar char="Ø"/>
+              </a:pPr>
+              <a:r>
+                <a:rPr lang="es-MX" sz="1100" dirty="0"/>
+                <a:t>Falta de diversidad en las Interacciones</a:t>
+              </a:r>
+            </a:p>
+            <a:p>
+              <a:pPr marL="628650" lvl="1" indent="-171450">
+                <a:buFont typeface="Wingdings" panose="05000000000000000000" pitchFamily="2" charset="2"/>
+                <a:buChar char="Ø"/>
+              </a:pPr>
+              <a:r>
+                <a:rPr lang="es-MX" sz="1100" dirty="0"/>
+                <a:t>Cold Start </a:t>
+              </a:r>
+            </a:p>
+            <a:p>
+              <a:pPr marL="628650" lvl="1" indent="-171450">
+                <a:buFont typeface="Wingdings" panose="05000000000000000000" pitchFamily="2" charset="2"/>
+                <a:buChar char="Ø"/>
+              </a:pPr>
+              <a:r>
+                <a:rPr lang="es-CL" sz="1100" dirty="0"/>
+                <a:t>Representación de las características</a:t>
+              </a:r>
+            </a:p>
+            <a:p>
+              <a:pPr marL="171450" indent="-171450">
+                <a:buFont typeface="Arial" panose="020B0604020202020204" pitchFamily="34" charset="0"/>
+                <a:buChar char="•"/>
+              </a:pPr>
+              <a:endParaRPr lang="es-MX" sz="1100" dirty="0"/>
+            </a:p>
+            <a:p>
+              <a:pPr marL="171450" indent="-171450">
+                <a:buFont typeface="Arial" panose="020B0604020202020204" pitchFamily="34" charset="0"/>
+                <a:buChar char="•"/>
+              </a:pPr>
+              <a:r>
+                <a:rPr lang="es-MX" sz="1100" dirty="0"/>
+                <a:t>Modelo</a:t>
+              </a:r>
+            </a:p>
+            <a:p>
+              <a:pPr marL="628650" lvl="1" indent="-171450">
+                <a:buFont typeface="Wingdings" panose="05000000000000000000" pitchFamily="2" charset="2"/>
+                <a:buChar char="Ø"/>
+              </a:pPr>
+              <a:r>
+                <a:rPr lang="es-CL" sz="1100" dirty="0"/>
+                <a:t>Falta de contexto temporal</a:t>
+              </a:r>
+            </a:p>
+            <a:p>
+              <a:pPr marL="628650" lvl="1" indent="-171450">
+                <a:buFont typeface="Wingdings" panose="05000000000000000000" pitchFamily="2" charset="2"/>
+                <a:buChar char="Ø"/>
+              </a:pPr>
+              <a:r>
+                <a:rPr lang="es-CL" sz="1100" dirty="0"/>
+                <a:t>Escalabilidad</a:t>
+              </a:r>
+            </a:p>
+            <a:p>
+              <a:pPr marL="628650" lvl="1" indent="-171450">
+                <a:buFont typeface="Wingdings" panose="05000000000000000000" pitchFamily="2" charset="2"/>
+                <a:buChar char="Ø"/>
+              </a:pPr>
+              <a:r>
+                <a:rPr lang="es-CL" sz="1100" dirty="0"/>
+                <a:t>Rigidez del diseño</a:t>
+              </a:r>
+              <a:endParaRPr lang="es-MX" sz="1100" dirty="0"/>
+            </a:p>
+          </p:txBody>
+        </p:sp>
+        <p:sp>
+          <p:nvSpPr>
+            <p:cNvPr id="4" name="CuadroTexto 3">
+              <a:extLst>
+                <a:ext uri="{FF2B5EF4-FFF2-40B4-BE49-F238E27FC236}">
+                  <a16:creationId xmlns:a16="http://schemas.microsoft.com/office/drawing/2014/main" id="{463D023C-3C3E-E64C-0E25-4C28898D640A}"/>
+                </a:ext>
+              </a:extLst>
+            </p:cNvPr>
+            <p:cNvSpPr txBox="1"/>
+            <p:nvPr/>
+          </p:nvSpPr>
+          <p:spPr>
+            <a:xfrm>
+              <a:off x="4803516" y="2818656"/>
+              <a:ext cx="3571870" cy="1200329"/>
+            </a:xfrm>
+            <a:prstGeom prst="rect">
+              <a:avLst/>
+            </a:prstGeom>
+            <a:noFill/>
+          </p:spPr>
+          <p:txBody>
+            <a:bodyPr wrap="square" rtlCol="0">
+              <a:spAutoFit/>
+            </a:bodyPr>
+            <a:lstStyle/>
+            <a:p>
+              <a:r>
+                <a:rPr lang="es-MX" b="1" dirty="0"/>
+                <a:t>Trabajos futuros</a:t>
+              </a:r>
+            </a:p>
+            <a:p>
+              <a:endParaRPr lang="es-MX" b="1" dirty="0"/>
+            </a:p>
+            <a:p>
+              <a:pPr marL="628650" lvl="1" indent="-171450">
+                <a:buFont typeface="Wingdings" panose="05000000000000000000" pitchFamily="2" charset="2"/>
+                <a:buChar char="Ø"/>
+              </a:pPr>
+              <a:r>
+                <a:rPr lang="es-MX" sz="1100" dirty="0"/>
+                <a:t>Regularización del sesgo</a:t>
+              </a:r>
+            </a:p>
+            <a:p>
+              <a:pPr marL="628650" lvl="1" indent="-171450">
+                <a:buFont typeface="Wingdings" panose="05000000000000000000" pitchFamily="2" charset="2"/>
+                <a:buChar char="Ø"/>
+              </a:pPr>
+              <a:r>
+                <a:rPr lang="es-MX" sz="1100" dirty="0"/>
+                <a:t>Optimización de la métrica de novedad</a:t>
+              </a:r>
+            </a:p>
+            <a:p>
+              <a:pPr marL="628650" lvl="1" indent="-171450">
+                <a:buFont typeface="Wingdings" panose="05000000000000000000" pitchFamily="2" charset="2"/>
+                <a:buChar char="Ø"/>
+              </a:pPr>
+              <a:r>
+                <a:rPr lang="es-MX" sz="1100" dirty="0"/>
+                <a:t>Exploración de alternativas</a:t>
+              </a:r>
+            </a:p>
+            <a:p>
+              <a:pPr marL="628650" lvl="1" indent="-171450">
+                <a:buFont typeface="Wingdings" panose="05000000000000000000" pitchFamily="2" charset="2"/>
+                <a:buChar char="Ø"/>
+              </a:pPr>
+              <a:r>
+                <a:rPr lang="es-MX" sz="1100" dirty="0"/>
+                <a:t>Análisis del contexto</a:t>
+              </a:r>
+            </a:p>
+          </p:txBody>
+        </p:sp>
+      </p:grpSp>
     </p:spTree>
     <p:extLst>
       <p:ext uri="{BB962C8B-B14F-4D97-AF65-F5344CB8AC3E}">
@@ -14012,474 +13601,6 @@
 </file>
 
 <file path=ppt/slides/slide15.xml><?xml version="1.0" encoding="utf-8"?>
-<p:sld xmlns:a="http://schemas.openxmlformats.org/drawingml/2006/main" xmlns:r="http://schemas.openxmlformats.org/officeDocument/2006/relationships" xmlns:p="http://schemas.openxmlformats.org/presentationml/2006/main">
-  <p:cSld>
-    <p:spTree>
-      <p:nvGrpSpPr>
-        <p:cNvPr id="1" name="Shape 69">
-          <a:extLst>
-            <a:ext uri="{FF2B5EF4-FFF2-40B4-BE49-F238E27FC236}">
-              <a16:creationId xmlns:a16="http://schemas.microsoft.com/office/drawing/2014/main" id="{C750DBF7-3557-2DFD-F84A-F44FAFC433F9}"/>
-            </a:ext>
-          </a:extLst>
-        </p:cNvPr>
-        <p:cNvGrpSpPr/>
-        <p:nvPr/>
-      </p:nvGrpSpPr>
-      <p:grpSpPr>
-        <a:xfrm>
-          <a:off x="0" y="0"/>
-          <a:ext cx="0" cy="0"/>
-          <a:chOff x="0" y="0"/>
-          <a:chExt cx="0" cy="0"/>
-        </a:xfrm>
-      </p:grpSpPr>
-      <p:pic>
-        <p:nvPicPr>
-          <p:cNvPr id="70" name="Google Shape;70;p14">
-            <a:extLst>
-              <a:ext uri="{FF2B5EF4-FFF2-40B4-BE49-F238E27FC236}">
-                <a16:creationId xmlns:a16="http://schemas.microsoft.com/office/drawing/2014/main" id="{9E28325D-3828-C355-9281-EB71E28BE595}"/>
-              </a:ext>
-            </a:extLst>
-          </p:cNvPr>
-          <p:cNvPicPr preferRelativeResize="0"/>
-          <p:nvPr/>
-        </p:nvPicPr>
-        <p:blipFill rotWithShape="1">
-          <a:blip r:embed="rId3">
-            <a:alphaModFix/>
-          </a:blip>
-          <a:srcRect l="-150" t="20538" r="150" b="51650"/>
-          <a:stretch/>
-        </p:blipFill>
-        <p:spPr>
-          <a:xfrm>
-            <a:off x="-14013" y="-8905"/>
-            <a:ext cx="9172027" cy="602165"/>
-          </a:xfrm>
-          <a:prstGeom prst="rect">
-            <a:avLst/>
-          </a:prstGeom>
-          <a:noFill/>
-          <a:ln>
-            <a:noFill/>
-          </a:ln>
-        </p:spPr>
-      </p:pic>
-      <p:pic>
-        <p:nvPicPr>
-          <p:cNvPr id="71" name="Google Shape;71;p14">
-            <a:extLst>
-              <a:ext uri="{FF2B5EF4-FFF2-40B4-BE49-F238E27FC236}">
-                <a16:creationId xmlns:a16="http://schemas.microsoft.com/office/drawing/2014/main" id="{BF715ED6-4E3D-5E25-B71B-50468D29A3D2}"/>
-              </a:ext>
-            </a:extLst>
-          </p:cNvPr>
-          <p:cNvPicPr preferRelativeResize="0"/>
-          <p:nvPr/>
-        </p:nvPicPr>
-        <p:blipFill rotWithShape="1">
-          <a:blip r:embed="rId4">
-            <a:alphaModFix/>
-          </a:blip>
-          <a:srcRect/>
-          <a:stretch/>
-        </p:blipFill>
-        <p:spPr>
-          <a:xfrm>
-            <a:off x="8316024" y="67165"/>
-            <a:ext cx="539441" cy="450022"/>
-          </a:xfrm>
-          <a:prstGeom prst="rect">
-            <a:avLst/>
-          </a:prstGeom>
-          <a:noFill/>
-          <a:ln>
-            <a:noFill/>
-          </a:ln>
-        </p:spPr>
-      </p:pic>
-      <p:sp>
-        <p:nvSpPr>
-          <p:cNvPr id="72" name="Google Shape;72;p14">
-            <a:extLst>
-              <a:ext uri="{FF2B5EF4-FFF2-40B4-BE49-F238E27FC236}">
-                <a16:creationId xmlns:a16="http://schemas.microsoft.com/office/drawing/2014/main" id="{1B00CDA3-CB81-EAF4-C8EF-0D8994ED5ADA}"/>
-              </a:ext>
-            </a:extLst>
-          </p:cNvPr>
-          <p:cNvSpPr txBox="1"/>
-          <p:nvPr/>
-        </p:nvSpPr>
-        <p:spPr>
-          <a:xfrm>
-            <a:off x="65921" y="67165"/>
-            <a:ext cx="7804500" cy="461624"/>
-          </a:xfrm>
-          <a:prstGeom prst="rect">
-            <a:avLst/>
-          </a:prstGeom>
-          <a:noFill/>
-          <a:ln>
-            <a:noFill/>
-          </a:ln>
-        </p:spPr>
-        <p:txBody>
-          <a:bodyPr spcFirstLastPara="1" wrap="square" lIns="91425" tIns="45700" rIns="91425" bIns="45700" anchor="t" anchorCtr="0">
-            <a:spAutoFit/>
-          </a:bodyPr>
-          <a:lstStyle/>
-          <a:p>
-            <a:pPr marL="0" marR="0" lvl="0" indent="0" algn="l" rtl="0">
-              <a:lnSpc>
-                <a:spcPct val="100000"/>
-              </a:lnSpc>
-              <a:spcBef>
-                <a:spcPts val="0"/>
-              </a:spcBef>
-              <a:spcAft>
-                <a:spcPts val="0"/>
-              </a:spcAft>
-              <a:buClr>
-                <a:srgbClr val="FFFFFF"/>
-              </a:buClr>
-              <a:buSzPts val="2400"/>
-              <a:buFont typeface="Helvetica Neue"/>
-              <a:buNone/>
-            </a:pPr>
-            <a:r>
-              <a:rPr lang="es-419" sz="2400" b="1" i="0" u="none" strike="noStrike" cap="none" dirty="0">
-                <a:solidFill>
-                  <a:srgbClr val="FFFFFF"/>
-                </a:solidFill>
-                <a:latin typeface="+mj-lt"/>
-                <a:ea typeface="Helvetica Neue"/>
-                <a:cs typeface="Helvetica Neue"/>
-                <a:sym typeface="Helvetica Neue"/>
-              </a:rPr>
-              <a:t>Limitaciones y </a:t>
-            </a:r>
-            <a:r>
-              <a:rPr lang="es-419" sz="2400" b="1" dirty="0">
-                <a:solidFill>
-                  <a:srgbClr val="FFFFFF"/>
-                </a:solidFill>
-                <a:latin typeface="+mj-lt"/>
-                <a:ea typeface="Helvetica Neue"/>
-                <a:cs typeface="Helvetica Neue"/>
-                <a:sym typeface="Helvetica Neue"/>
-              </a:rPr>
-              <a:t>t</a:t>
-            </a:r>
-            <a:r>
-              <a:rPr lang="es-419" sz="2400" b="1" i="0" u="none" strike="noStrike" cap="none" dirty="0">
-                <a:solidFill>
-                  <a:srgbClr val="FFFFFF"/>
-                </a:solidFill>
-                <a:latin typeface="+mj-lt"/>
-                <a:ea typeface="Helvetica Neue"/>
-                <a:cs typeface="Helvetica Neue"/>
-                <a:sym typeface="Helvetica Neue"/>
-              </a:rPr>
-              <a:t>rabajos futuros</a:t>
-            </a:r>
-            <a:endParaRPr sz="1200" b="1" i="0" u="none" strike="noStrike" cap="none" dirty="0">
-              <a:solidFill>
-                <a:srgbClr val="FFFFFF"/>
-              </a:solidFill>
-              <a:latin typeface="+mj-lt"/>
-              <a:ea typeface="Helvetica Neue"/>
-              <a:cs typeface="Helvetica Neue"/>
-              <a:sym typeface="Helvetica Neue"/>
-            </a:endParaRPr>
-          </a:p>
-        </p:txBody>
-      </p:sp>
-      <p:sp>
-        <p:nvSpPr>
-          <p:cNvPr id="73" name="Google Shape;73;p14">
-            <a:extLst>
-              <a:ext uri="{FF2B5EF4-FFF2-40B4-BE49-F238E27FC236}">
-                <a16:creationId xmlns:a16="http://schemas.microsoft.com/office/drawing/2014/main" id="{144E4F0E-FFE2-5478-947E-2029B174B489}"/>
-              </a:ext>
-            </a:extLst>
-          </p:cNvPr>
-          <p:cNvSpPr txBox="1">
-            <a:spLocks noGrp="1"/>
-          </p:cNvSpPr>
-          <p:nvPr>
-            <p:ph type="sldNum" idx="12"/>
-          </p:nvPr>
-        </p:nvSpPr>
-        <p:spPr>
-          <a:xfrm>
-            <a:off x="8472458" y="4663217"/>
-            <a:ext cx="548700" cy="393600"/>
-          </a:xfrm>
-          <a:prstGeom prst="rect">
-            <a:avLst/>
-          </a:prstGeom>
-        </p:spPr>
-        <p:txBody>
-          <a:bodyPr spcFirstLastPara="1" wrap="square" lIns="91425" tIns="91425" rIns="91425" bIns="91425" anchor="ctr" anchorCtr="0">
-            <a:normAutofit/>
-          </a:bodyPr>
-          <a:lstStyle/>
-          <a:p>
-            <a:pPr marL="0" lvl="0" indent="0" algn="r" rtl="0">
-              <a:spcBef>
-                <a:spcPts val="0"/>
-              </a:spcBef>
-              <a:spcAft>
-                <a:spcPts val="0"/>
-              </a:spcAft>
-              <a:buNone/>
-            </a:pPr>
-            <a:fld id="{00000000-1234-1234-1234-123412341234}" type="slidenum">
-              <a:rPr lang="es-419"/>
-              <a:t>15</a:t>
-            </a:fld>
-            <a:endParaRPr/>
-          </a:p>
-        </p:txBody>
-      </p:sp>
-      <p:sp>
-        <p:nvSpPr>
-          <p:cNvPr id="11" name="CuadroTexto 10">
-            <a:extLst>
-              <a:ext uri="{FF2B5EF4-FFF2-40B4-BE49-F238E27FC236}">
-                <a16:creationId xmlns:a16="http://schemas.microsoft.com/office/drawing/2014/main" id="{370B7F3C-C033-0C88-58C6-3A5A05A66D10}"/>
-              </a:ext>
-            </a:extLst>
-          </p:cNvPr>
-          <p:cNvSpPr txBox="1"/>
-          <p:nvPr/>
-        </p:nvSpPr>
-        <p:spPr>
-          <a:xfrm>
-            <a:off x="693152" y="1765162"/>
-            <a:ext cx="3571871" cy="2169825"/>
-          </a:xfrm>
-          <a:prstGeom prst="rect">
-            <a:avLst/>
-          </a:prstGeom>
-          <a:noFill/>
-        </p:spPr>
-        <p:txBody>
-          <a:bodyPr wrap="square" rtlCol="0">
-            <a:spAutoFit/>
-          </a:bodyPr>
-          <a:lstStyle/>
-          <a:p>
-            <a:r>
-              <a:rPr lang="es-MX" b="1" dirty="0"/>
-              <a:t>Limitaciones</a:t>
-            </a:r>
-          </a:p>
-          <a:p>
-            <a:pPr marL="171450" indent="-171450">
-              <a:buFont typeface="Arial" panose="020B0604020202020204" pitchFamily="34" charset="0"/>
-              <a:buChar char="•"/>
-            </a:pPr>
-            <a:r>
-              <a:rPr lang="es-MX" sz="1100" dirty="0"/>
-              <a:t>Datos</a:t>
-            </a:r>
-          </a:p>
-          <a:p>
-            <a:pPr marL="628650" lvl="1" indent="-171450">
-              <a:buFont typeface="Wingdings" panose="05000000000000000000" pitchFamily="2" charset="2"/>
-              <a:buChar char="Ø"/>
-            </a:pPr>
-            <a:r>
-              <a:rPr lang="es-MX" sz="1100" dirty="0"/>
-              <a:t>Dependencia de los datos de entrenamiento</a:t>
-            </a:r>
-          </a:p>
-          <a:p>
-            <a:pPr marL="628650" lvl="1" indent="-171450">
-              <a:buFont typeface="Wingdings" panose="05000000000000000000" pitchFamily="2" charset="2"/>
-              <a:buChar char="Ø"/>
-            </a:pPr>
-            <a:r>
-              <a:rPr lang="es-CL" sz="1100" dirty="0"/>
-              <a:t>Sesgo hacia ítems populares</a:t>
-            </a:r>
-            <a:endParaRPr lang="es-MX" sz="1100" dirty="0"/>
-          </a:p>
-          <a:p>
-            <a:pPr marL="628650" lvl="1" indent="-171450">
-              <a:buFont typeface="Wingdings" panose="05000000000000000000" pitchFamily="2" charset="2"/>
-              <a:buChar char="Ø"/>
-            </a:pPr>
-            <a:r>
-              <a:rPr lang="es-MX" sz="1100" dirty="0"/>
-              <a:t>Falta de diversidad en las Interacciones</a:t>
-            </a:r>
-          </a:p>
-          <a:p>
-            <a:pPr marL="628650" lvl="1" indent="-171450">
-              <a:buFont typeface="Wingdings" panose="05000000000000000000" pitchFamily="2" charset="2"/>
-              <a:buChar char="Ø"/>
-            </a:pPr>
-            <a:r>
-              <a:rPr lang="es-MX" sz="1100" dirty="0"/>
-              <a:t>Cold Start </a:t>
-            </a:r>
-          </a:p>
-          <a:p>
-            <a:pPr marL="628650" lvl="1" indent="-171450">
-              <a:buFont typeface="Wingdings" panose="05000000000000000000" pitchFamily="2" charset="2"/>
-              <a:buChar char="Ø"/>
-            </a:pPr>
-            <a:r>
-              <a:rPr lang="es-CL" sz="1100" dirty="0"/>
-              <a:t>Representación de las características</a:t>
-            </a:r>
-          </a:p>
-          <a:p>
-            <a:pPr marL="171450" indent="-171450">
-              <a:buFont typeface="Arial" panose="020B0604020202020204" pitchFamily="34" charset="0"/>
-              <a:buChar char="•"/>
-            </a:pPr>
-            <a:endParaRPr lang="es-MX" sz="1100" dirty="0"/>
-          </a:p>
-          <a:p>
-            <a:pPr marL="171450" indent="-171450">
-              <a:buFont typeface="Arial" panose="020B0604020202020204" pitchFamily="34" charset="0"/>
-              <a:buChar char="•"/>
-            </a:pPr>
-            <a:r>
-              <a:rPr lang="es-MX" sz="1100" dirty="0"/>
-              <a:t>Modelo</a:t>
-            </a:r>
-          </a:p>
-          <a:p>
-            <a:pPr marL="628650" lvl="1" indent="-171450">
-              <a:buFont typeface="Wingdings" panose="05000000000000000000" pitchFamily="2" charset="2"/>
-              <a:buChar char="Ø"/>
-            </a:pPr>
-            <a:r>
-              <a:rPr lang="es-CL" sz="1100" dirty="0"/>
-              <a:t>Falta de contexto temporal</a:t>
-            </a:r>
-          </a:p>
-          <a:p>
-            <a:pPr marL="628650" lvl="1" indent="-171450">
-              <a:buFont typeface="Wingdings" panose="05000000000000000000" pitchFamily="2" charset="2"/>
-              <a:buChar char="Ø"/>
-            </a:pPr>
-            <a:r>
-              <a:rPr lang="es-CL" sz="1100" dirty="0"/>
-              <a:t>Escalabilidad</a:t>
-            </a:r>
-          </a:p>
-          <a:p>
-            <a:pPr marL="628650" lvl="1" indent="-171450">
-              <a:buFont typeface="Wingdings" panose="05000000000000000000" pitchFamily="2" charset="2"/>
-              <a:buChar char="Ø"/>
-            </a:pPr>
-            <a:r>
-              <a:rPr lang="es-CL" sz="1100" dirty="0"/>
-              <a:t>Rigidez del diseño</a:t>
-            </a:r>
-            <a:endParaRPr lang="es-MX" sz="1100" dirty="0"/>
-          </a:p>
-        </p:txBody>
-      </p:sp>
-      <p:sp>
-        <p:nvSpPr>
-          <p:cNvPr id="2" name="CuadroTexto 1">
-            <a:extLst>
-              <a:ext uri="{FF2B5EF4-FFF2-40B4-BE49-F238E27FC236}">
-                <a16:creationId xmlns:a16="http://schemas.microsoft.com/office/drawing/2014/main" id="{463D023C-3C3E-E64C-0E25-4C28898D640A}"/>
-              </a:ext>
-            </a:extLst>
-          </p:cNvPr>
-          <p:cNvSpPr txBox="1"/>
-          <p:nvPr/>
-        </p:nvSpPr>
-        <p:spPr>
-          <a:xfrm>
-            <a:off x="4723044" y="1765162"/>
-            <a:ext cx="3238768" cy="1200329"/>
-          </a:xfrm>
-          <a:prstGeom prst="rect">
-            <a:avLst/>
-          </a:prstGeom>
-          <a:noFill/>
-        </p:spPr>
-        <p:txBody>
-          <a:bodyPr wrap="square" rtlCol="0">
-            <a:spAutoFit/>
-          </a:bodyPr>
-          <a:lstStyle/>
-          <a:p>
-            <a:r>
-              <a:rPr lang="es-MX" b="1" dirty="0"/>
-              <a:t>Trabajos futuros</a:t>
-            </a:r>
-          </a:p>
-          <a:p>
-            <a:endParaRPr lang="es-MX" b="1" dirty="0"/>
-          </a:p>
-          <a:p>
-            <a:pPr marL="628650" lvl="1" indent="-171450">
-              <a:buFont typeface="Wingdings" panose="05000000000000000000" pitchFamily="2" charset="2"/>
-              <a:buChar char="Ø"/>
-            </a:pPr>
-            <a:r>
-              <a:rPr lang="es-MX" sz="1100" dirty="0"/>
-              <a:t>Regularización del sesgo</a:t>
-            </a:r>
-          </a:p>
-          <a:p>
-            <a:pPr marL="628650" lvl="1" indent="-171450">
-              <a:buFont typeface="Wingdings" panose="05000000000000000000" pitchFamily="2" charset="2"/>
-              <a:buChar char="Ø"/>
-            </a:pPr>
-            <a:r>
-              <a:rPr lang="es-MX" sz="1100" dirty="0"/>
-              <a:t>Optimización de la métrica de novedad</a:t>
-            </a:r>
-          </a:p>
-          <a:p>
-            <a:pPr marL="628650" lvl="1" indent="-171450">
-              <a:buFont typeface="Wingdings" panose="05000000000000000000" pitchFamily="2" charset="2"/>
-              <a:buChar char="Ø"/>
-            </a:pPr>
-            <a:r>
-              <a:rPr lang="es-MX" sz="1100" dirty="0"/>
-              <a:t>Exploración de alternativas</a:t>
-            </a:r>
-          </a:p>
-          <a:p>
-            <a:pPr marL="628650" lvl="1" indent="-171450">
-              <a:buFont typeface="Wingdings" panose="05000000000000000000" pitchFamily="2" charset="2"/>
-              <a:buChar char="Ø"/>
-            </a:pPr>
-            <a:r>
-              <a:rPr lang="es-MX" sz="1100" dirty="0"/>
-              <a:t>Análisis del contexto</a:t>
-            </a:r>
-          </a:p>
-        </p:txBody>
-      </p:sp>
-    </p:spTree>
-    <p:extLst>
-      <p:ext uri="{BB962C8B-B14F-4D97-AF65-F5344CB8AC3E}">
-        <p14:creationId xmlns:p14="http://schemas.microsoft.com/office/powerpoint/2010/main" val="2353190985"/>
-      </p:ext>
-    </p:extLst>
-  </p:cSld>
-  <p:clrMapOvr>
-    <a:masterClrMapping/>
-  </p:clrMapOvr>
-</p:sld>
-</file>
-
-<file path=ppt/slides/slide16.xml><?xml version="1.0" encoding="utf-8"?>
 <p:sld xmlns:a="http://schemas.openxmlformats.org/drawingml/2006/main" xmlns:r="http://schemas.openxmlformats.org/officeDocument/2006/relationships" xmlns:p="http://schemas.openxmlformats.org/presentationml/2006/main">
   <p:cSld>
     <p:bg>
@@ -14842,7 +13963,7 @@
             </a:pPr>
             <a:fld id="{00000000-1234-1234-1234-123412341234}" type="slidenum">
               <a:rPr lang="es-419"/>
-              <a:t>16</a:t>
+              <a:t>15</a:t>
             </a:fld>
             <a:endParaRPr/>
           </a:p>
@@ -15956,7 +15077,7 @@
         </p:blipFill>
         <p:spPr>
           <a:xfrm>
-            <a:off x="2640778" y="933058"/>
+            <a:off x="4502235" y="804616"/>
             <a:ext cx="3862441" cy="2489041"/>
           </a:xfrm>
           <a:prstGeom prst="rect">
@@ -15990,7 +15111,7 @@
         </p:nvSpPr>
         <p:spPr>
           <a:xfrm>
-            <a:off x="2586640" y="3616330"/>
+            <a:off x="4345306" y="3505013"/>
             <a:ext cx="3970718" cy="1092607"/>
           </a:xfrm>
           <a:prstGeom prst="rect">
@@ -16038,6 +15159,192 @@
             </a:r>
           </a:p>
           <a:p>
+            <a:endParaRPr lang="es-CL" dirty="0"/>
+          </a:p>
+        </p:txBody>
+      </p:sp>
+      <p:pic>
+        <p:nvPicPr>
+          <p:cNvPr id="3" name="Imagen 2">
+            <a:extLst>
+              <a:ext uri="{FF2B5EF4-FFF2-40B4-BE49-F238E27FC236}">
+                <a16:creationId xmlns:a16="http://schemas.microsoft.com/office/drawing/2014/main" id="{044F9E9B-7017-4C4E-EF8E-DD2B93B4FEFF}"/>
+              </a:ext>
+            </a:extLst>
+          </p:cNvPr>
+          <p:cNvPicPr>
+            <a:picLocks noChangeAspect="1"/>
+          </p:cNvPicPr>
+          <p:nvPr/>
+        </p:nvPicPr>
+        <p:blipFill>
+          <a:blip r:embed="rId6"/>
+          <a:stretch>
+            <a:fillRect/>
+          </a:stretch>
+        </p:blipFill>
+        <p:spPr>
+          <a:xfrm>
+            <a:off x="262706" y="1562262"/>
+            <a:ext cx="2728688" cy="1494447"/>
+          </a:xfrm>
+          <a:prstGeom prst="rect">
+            <a:avLst/>
+          </a:prstGeom>
+        </p:spPr>
+      </p:pic>
+      <p:sp>
+        <p:nvSpPr>
+          <p:cNvPr id="4" name="CuadroTexto 3">
+            <a:extLst>
+              <a:ext uri="{FF2B5EF4-FFF2-40B4-BE49-F238E27FC236}">
+                <a16:creationId xmlns:a16="http://schemas.microsoft.com/office/drawing/2014/main" id="{503C9E15-4AB9-2BD9-2277-F6E8425692A5}"/>
+              </a:ext>
+            </a:extLst>
+          </p:cNvPr>
+          <p:cNvSpPr txBox="1"/>
+          <p:nvPr/>
+        </p:nvSpPr>
+        <p:spPr>
+          <a:xfrm>
+            <a:off x="437710" y="3203222"/>
+            <a:ext cx="2997319" cy="877163"/>
+          </a:xfrm>
+          <a:prstGeom prst="rect">
+            <a:avLst/>
+          </a:prstGeom>
+          <a:noFill/>
+        </p:spPr>
+        <p:txBody>
+          <a:bodyPr wrap="square" rtlCol="0">
+            <a:spAutoFit/>
+          </a:bodyPr>
+          <a:lstStyle/>
+          <a:p>
+            <a:pPr marL="0" lvl="0" indent="0" algn="ctr" rtl="0">
+              <a:spcBef>
+                <a:spcPts val="0"/>
+              </a:spcBef>
+              <a:spcAft>
+                <a:spcPts val="0"/>
+              </a:spcAft>
+              <a:buNone/>
+            </a:pPr>
+            <a:r>
+              <a:rPr lang="en-US" b="0" i="0" dirty="0">
+                <a:effectLst/>
+                <a:latin typeface="Arial" panose="020B0604020202020204" pitchFamily="34" charset="0"/>
+              </a:rPr>
+              <a:t>Mixed Negative Sampling for Learning Two-tower Neural Networks in Recommendations</a:t>
+            </a:r>
+          </a:p>
+          <a:p>
+            <a:pPr marL="0" lvl="0" indent="0" algn="ctr" rtl="0">
+              <a:spcBef>
+                <a:spcPts val="0"/>
+              </a:spcBef>
+              <a:spcAft>
+                <a:spcPts val="0"/>
+              </a:spcAft>
+              <a:buNone/>
+            </a:pPr>
+            <a:r>
+              <a:rPr lang="es-CL" sz="900" dirty="0"/>
+              <a:t>https://doi.org/10.1145/3366424.3386195</a:t>
+            </a:r>
+            <a:endParaRPr lang="es-CL" dirty="0"/>
+          </a:p>
+        </p:txBody>
+      </p:sp>
+      <p:pic>
+        <p:nvPicPr>
+          <p:cNvPr id="6" name="Imagen 5">
+            <a:extLst>
+              <a:ext uri="{FF2B5EF4-FFF2-40B4-BE49-F238E27FC236}">
+                <a16:creationId xmlns:a16="http://schemas.microsoft.com/office/drawing/2014/main" id="{7F083EE2-CC88-B1E1-CEDC-C4704ED4F924}"/>
+              </a:ext>
+            </a:extLst>
+          </p:cNvPr>
+          <p:cNvPicPr>
+            <a:picLocks noChangeAspect="1"/>
+          </p:cNvPicPr>
+          <p:nvPr/>
+        </p:nvPicPr>
+        <p:blipFill>
+          <a:blip r:embed="rId7"/>
+          <a:stretch>
+            <a:fillRect/>
+          </a:stretch>
+        </p:blipFill>
+        <p:spPr>
+          <a:xfrm>
+            <a:off x="1833381" y="1327417"/>
+            <a:ext cx="4113573" cy="2038399"/>
+          </a:xfrm>
+          <a:prstGeom prst="rect">
+            <a:avLst/>
+          </a:prstGeom>
+        </p:spPr>
+      </p:pic>
+      <p:sp>
+        <p:nvSpPr>
+          <p:cNvPr id="8" name="CuadroTexto 7">
+            <a:extLst>
+              <a:ext uri="{FF2B5EF4-FFF2-40B4-BE49-F238E27FC236}">
+                <a16:creationId xmlns:a16="http://schemas.microsoft.com/office/drawing/2014/main" id="{487CCF38-0EA6-5F1D-04D7-6A6F568A64D2}"/>
+              </a:ext>
+            </a:extLst>
+          </p:cNvPr>
+          <p:cNvSpPr txBox="1"/>
+          <p:nvPr/>
+        </p:nvSpPr>
+        <p:spPr>
+          <a:xfrm>
+            <a:off x="1936369" y="4204599"/>
+            <a:ext cx="2997319" cy="877163"/>
+          </a:xfrm>
+          <a:prstGeom prst="rect">
+            <a:avLst/>
+          </a:prstGeom>
+          <a:noFill/>
+        </p:spPr>
+        <p:txBody>
+          <a:bodyPr wrap="square" rtlCol="0">
+            <a:spAutoFit/>
+          </a:bodyPr>
+          <a:lstStyle/>
+          <a:p>
+            <a:pPr marL="0" lvl="0" indent="0" algn="ctr" rtl="0">
+              <a:spcBef>
+                <a:spcPts val="0"/>
+              </a:spcBef>
+              <a:spcAft>
+                <a:spcPts val="0"/>
+              </a:spcAft>
+              <a:buNone/>
+            </a:pPr>
+            <a:r>
+              <a:rPr lang="en-US" b="0" i="0" dirty="0">
+                <a:effectLst/>
+                <a:latin typeface="Arial" panose="020B0604020202020204" pitchFamily="34" charset="0"/>
+              </a:rPr>
+              <a:t>IntTower: The Next Generation of Two-Tower Model for Pre-Ranking System</a:t>
+            </a:r>
+          </a:p>
+          <a:p>
+            <a:pPr marL="0" lvl="0" indent="0" algn="ctr" rtl="0">
+              <a:spcBef>
+                <a:spcPts val="0"/>
+              </a:spcBef>
+              <a:spcAft>
+                <a:spcPts val="0"/>
+              </a:spcAft>
+              <a:buNone/>
+            </a:pPr>
+            <a:r>
+              <a:rPr lang="es-CL" sz="900" dirty="0"/>
+              <a:t>https://doi.org/10.1145/3511808.3557072</a:t>
+            </a:r>
             <a:endParaRPr lang="es-CL" dirty="0"/>
           </a:p>
         </p:txBody>

</xml_diff>

<commit_message>
docs (presentacion): presentacion final
</commit_message>
<xml_diff>
--- a/docs/presentacion.pptx
+++ b/docs/presentacion.pptx
@@ -14,8 +14,8 @@
     <p:sldId id="277" r:id="rId5"/>
     <p:sldId id="278" r:id="rId6"/>
     <p:sldId id="279" r:id="rId7"/>
-    <p:sldId id="280" r:id="rId8"/>
-    <p:sldId id="291" r:id="rId9"/>
+    <p:sldId id="291" r:id="rId8"/>
+    <p:sldId id="280" r:id="rId9"/>
     <p:sldId id="286" r:id="rId10"/>
     <p:sldId id="281" r:id="rId11"/>
     <p:sldId id="282" r:id="rId12"/>
@@ -3580,15 +3580,7 @@
           <a:p>
             <a:r>
               <a:rPr lang="es-MX" sz="1100" b="1" dirty="0"/>
-              <a:t>Modelo </a:t>
-            </a:r>
-            <a:r>
-              <a:rPr lang="es-MX" sz="1100" b="1" dirty="0" err="1"/>
-              <a:t>SparseTwoTower</a:t>
-            </a:r>
-            <a:r>
-              <a:rPr lang="es-MX" sz="1100" b="1" dirty="0"/>
-              <a:t> con torres V3</a:t>
+              <a:t>Modelo SparseTwoTower con torres V3</a:t>
             </a:r>
             <a:r>
               <a:rPr lang="es-MX" sz="1100" dirty="0"/>
@@ -5308,7 +5300,7 @@
         <p:cNvPr id="1" name="Shape 65">
           <a:extLst>
             <a:ext uri="{FF2B5EF4-FFF2-40B4-BE49-F238E27FC236}">
-              <a16:creationId xmlns:a16="http://schemas.microsoft.com/office/drawing/2014/main" id="{920874E6-4BCE-528F-C858-5CB2732DD737}"/>
+              <a16:creationId xmlns:a16="http://schemas.microsoft.com/office/drawing/2014/main" id="{2C821224-C965-95DD-89F8-0CD330230A71}"/>
             </a:ext>
           </a:extLst>
         </p:cNvPr>
@@ -5328,7 +5320,7 @@
           <p:cNvPr id="66" name="Google Shape;66;g2fdea72edd2_0_58:notes">
             <a:extLst>
               <a:ext uri="{FF2B5EF4-FFF2-40B4-BE49-F238E27FC236}">
-                <a16:creationId xmlns:a16="http://schemas.microsoft.com/office/drawing/2014/main" id="{87B3F4FD-129B-2774-CFB0-7768F0CDF975}"/>
+                <a16:creationId xmlns:a16="http://schemas.microsoft.com/office/drawing/2014/main" id="{BB9897EA-28CE-08CB-CE64-E1C0224CE6EC}"/>
               </a:ext>
             </a:extLst>
           </p:cNvPr>
@@ -5385,7 +5377,7 @@
           <p:cNvPr id="67" name="Google Shape;67;g2fdea72edd2_0_58:notes">
             <a:extLst>
               <a:ext uri="{FF2B5EF4-FFF2-40B4-BE49-F238E27FC236}">
-                <a16:creationId xmlns:a16="http://schemas.microsoft.com/office/drawing/2014/main" id="{7D24D658-81B1-48AC-93BB-EB75EB980E93}"/>
+                <a16:creationId xmlns:a16="http://schemas.microsoft.com/office/drawing/2014/main" id="{31903E76-DDCE-014E-5A75-3DC56CCEC21E}"/>
               </a:ext>
             </a:extLst>
           </p:cNvPr>
@@ -5517,7 +5509,7 @@
           <p:cNvPr id="68" name="Google Shape;68;g2fdea72edd2_0_58:notes">
             <a:extLst>
               <a:ext uri="{FF2B5EF4-FFF2-40B4-BE49-F238E27FC236}">
-                <a16:creationId xmlns:a16="http://schemas.microsoft.com/office/drawing/2014/main" id="{56269DF5-BA7C-6533-F151-89BD58B755EB}"/>
+                <a16:creationId xmlns:a16="http://schemas.microsoft.com/office/drawing/2014/main" id="{7D33016F-2A97-3C30-25C1-25ABF5726D81}"/>
               </a:ext>
             </a:extLst>
           </p:cNvPr>
@@ -5591,7 +5583,7 @@
     </p:spTree>
     <p:extLst>
       <p:ext uri="{BB962C8B-B14F-4D97-AF65-F5344CB8AC3E}">
-        <p14:creationId xmlns:p14="http://schemas.microsoft.com/office/powerpoint/2010/main" val="3517822395"/>
+        <p14:creationId xmlns:p14="http://schemas.microsoft.com/office/powerpoint/2010/main" val="3865343277"/>
       </p:ext>
     </p:extLst>
   </p:cSld>
@@ -5609,7 +5601,7 @@
         <p:cNvPr id="1" name="Shape 65">
           <a:extLst>
             <a:ext uri="{FF2B5EF4-FFF2-40B4-BE49-F238E27FC236}">
-              <a16:creationId xmlns:a16="http://schemas.microsoft.com/office/drawing/2014/main" id="{2C821224-C965-95DD-89F8-0CD330230A71}"/>
+              <a16:creationId xmlns:a16="http://schemas.microsoft.com/office/drawing/2014/main" id="{920874E6-4BCE-528F-C858-5CB2732DD737}"/>
             </a:ext>
           </a:extLst>
         </p:cNvPr>
@@ -5629,7 +5621,7 @@
           <p:cNvPr id="66" name="Google Shape;66;g2fdea72edd2_0_58:notes">
             <a:extLst>
               <a:ext uri="{FF2B5EF4-FFF2-40B4-BE49-F238E27FC236}">
-                <a16:creationId xmlns:a16="http://schemas.microsoft.com/office/drawing/2014/main" id="{BB9897EA-28CE-08CB-CE64-E1C0224CE6EC}"/>
+                <a16:creationId xmlns:a16="http://schemas.microsoft.com/office/drawing/2014/main" id="{87B3F4FD-129B-2774-CFB0-7768F0CDF975}"/>
               </a:ext>
             </a:extLst>
           </p:cNvPr>
@@ -5686,7 +5678,7 @@
           <p:cNvPr id="67" name="Google Shape;67;g2fdea72edd2_0_58:notes">
             <a:extLst>
               <a:ext uri="{FF2B5EF4-FFF2-40B4-BE49-F238E27FC236}">
-                <a16:creationId xmlns:a16="http://schemas.microsoft.com/office/drawing/2014/main" id="{31903E76-DDCE-014E-5A75-3DC56CCEC21E}"/>
+                <a16:creationId xmlns:a16="http://schemas.microsoft.com/office/drawing/2014/main" id="{7D24D658-81B1-48AC-93BB-EB75EB980E93}"/>
               </a:ext>
             </a:extLst>
           </p:cNvPr>
@@ -5818,7 +5810,7 @@
           <p:cNvPr id="68" name="Google Shape;68;g2fdea72edd2_0_58:notes">
             <a:extLst>
               <a:ext uri="{FF2B5EF4-FFF2-40B4-BE49-F238E27FC236}">
-                <a16:creationId xmlns:a16="http://schemas.microsoft.com/office/drawing/2014/main" id="{7D33016F-2A97-3C30-25C1-25ABF5726D81}"/>
+                <a16:creationId xmlns:a16="http://schemas.microsoft.com/office/drawing/2014/main" id="{56269DF5-BA7C-6533-F151-89BD58B755EB}"/>
               </a:ext>
             </a:extLst>
           </p:cNvPr>
@@ -5892,7 +5884,7 @@
     </p:spTree>
     <p:extLst>
       <p:ext uri="{BB962C8B-B14F-4D97-AF65-F5344CB8AC3E}">
-        <p14:creationId xmlns:p14="http://schemas.microsoft.com/office/powerpoint/2010/main" val="3865343277"/>
+        <p14:creationId xmlns:p14="http://schemas.microsoft.com/office/powerpoint/2010/main" val="3517822395"/>
       </p:ext>
     </p:extLst>
   </p:cSld>
@@ -11176,43 +11168,8 @@
                 <a:cs typeface="Times New Roman" panose="02020603050405020304" pitchFamily="18" charset="0"/>
                 <a:sym typeface="Comfortaa"/>
               </a:rPr>
-              <a:t>Estudiante: Edgar Alejandro Ramos </a:t>
+              <a:t>Estudiante: Edgar Alejandro Ramos Vivenes</a:t>
             </a:r>
-            <a:r>
-              <a:rPr lang="es-419" sz="1200" b="1" dirty="0" err="1">
-                <a:solidFill>
-                  <a:schemeClr val="lt1"/>
-                </a:solidFill>
-                <a:effectLst>
-                  <a:outerShdw blurRad="38100" dist="38100" dir="2700000" algn="tl">
-                    <a:srgbClr val="000000">
-                      <a:alpha val="43137"/>
-                    </a:srgbClr>
-                  </a:outerShdw>
-                </a:effectLst>
-                <a:latin typeface="+mj-lt"/>
-                <a:ea typeface="Comfortaa"/>
-                <a:cs typeface="Times New Roman" panose="02020603050405020304" pitchFamily="18" charset="0"/>
-                <a:sym typeface="Comfortaa"/>
-              </a:rPr>
-              <a:t>Vivenes</a:t>
-            </a:r>
-            <a:endParaRPr lang="es-419" sz="1200" b="1" dirty="0">
-              <a:solidFill>
-                <a:schemeClr val="lt1"/>
-              </a:solidFill>
-              <a:effectLst>
-                <a:outerShdw blurRad="38100" dist="38100" dir="2700000" algn="tl">
-                  <a:srgbClr val="000000">
-                    <a:alpha val="43137"/>
-                  </a:srgbClr>
-                </a:outerShdw>
-              </a:effectLst>
-              <a:latin typeface="+mj-lt"/>
-              <a:ea typeface="Comfortaa"/>
-              <a:cs typeface="Times New Roman" panose="02020603050405020304" pitchFamily="18" charset="0"/>
-              <a:sym typeface="Comfortaa"/>
-            </a:endParaRPr>
           </a:p>
           <a:p>
             <a:pPr marL="0" marR="0" lvl="0" indent="0" algn="ctr" rtl="0">
@@ -13250,7 +13207,7 @@
         </p:nvSpPr>
         <p:spPr>
           <a:xfrm>
-            <a:off x="745583" y="817424"/>
+            <a:off x="745582" y="823955"/>
             <a:ext cx="7652833" cy="1754326"/>
           </a:xfrm>
           <a:prstGeom prst="rect">
@@ -13270,7 +13227,7 @@
             </a:pPr>
             <a:r>
               <a:rPr lang="es-MX" sz="900" dirty="0"/>
-              <a:t>La arquitectura modular permite probar variaciones en las torres de usuarios e ítems, adaptándose a diferentes escenarios y necesidades.</a:t>
+              <a:t>El modelo SparseTwoTower (V3) destacó por su precisión y relevancia, ofreciendo personalización efectiva en el aprendizaje de programación.</a:t>
             </a:r>
           </a:p>
           <a:p>
@@ -13287,60 +13244,63 @@
             </a:pPr>
             <a:r>
               <a:rPr lang="es-MX" sz="900" dirty="0"/>
-              <a:t>Los modelos integran métricas clave como Precision@k, Recall@k y NDCG@k para evaluar la calidad de las recomendaciones.</a:t>
+              <a:t>Las métricas de cobertura, novedad y sesgo de popularidad; demostraron que el sistema puede cubrir una porción significativa de los ítems disponibles, mientras se esfuerza por reducir el sesgo hacia los ítems populares.</a:t>
             </a:r>
+          </a:p>
+          <a:p>
+            <a:pPr algn="just"/>
+            <a:endParaRPr lang="es-MX" sz="900" dirty="0"/>
           </a:p>
           <a:p>
             <a:pPr marL="171450" indent="-171450" algn="just">
               <a:buFont typeface="Wingdings" panose="05000000000000000000" pitchFamily="2" charset="2"/>
               <a:buChar char="Ø"/>
             </a:pPr>
-            <a:endParaRPr lang="es-MX" sz="900" dirty="0"/>
+            <a:r>
+              <a:rPr lang="es-MX" sz="900" dirty="0"/>
+              <a:t>El sistema ajustó recomendaciones según las habilidades de los estudiantes, promoviendo un aprendizaje más adaptativo.</a:t>
+            </a:r>
           </a:p>
           <a:p>
             <a:pPr marL="171450" indent="-171450" algn="just">
               <a:buFont typeface="Wingdings" panose="05000000000000000000" pitchFamily="2" charset="2"/>
               <a:buChar char="Ø"/>
             </a:pPr>
-            <a:r>
-              <a:rPr lang="es-MX" sz="900" dirty="0"/>
-              <a:t>Algunos modelos, como el TwoTowerModelV1 y el TwoTowerModelV3, muestran un buen equilibrio entre precisión y cobertura, indicando que son capaces de realizar recomendaciones relevantes para la mayoría de los usuarios.</a:t>
-            </a:r>
+            <a:endParaRPr lang="es-MX" sz="900" dirty="0"/>
           </a:p>
           <a:p>
             <a:pPr marL="171450" indent="-171450" algn="just">
               <a:buFont typeface="Wingdings" panose="05000000000000000000" pitchFamily="2" charset="2"/>
               <a:buChar char="Ø"/>
             </a:pPr>
-            <a:endParaRPr lang="es-MX" sz="900" dirty="0"/>
+            <a:r>
+              <a:rPr lang="es-MX" sz="900" dirty="0"/>
+              <a:t>La escalabilidad y flexibilidad del diseño son esenciales para expandir el sistema a nuevos dominios educativos.</a:t>
+            </a:r>
           </a:p>
           <a:p>
             <a:pPr marL="171450" indent="-171450" algn="just">
               <a:buFont typeface="Wingdings" panose="05000000000000000000" pitchFamily="2" charset="2"/>
               <a:buChar char="Ø"/>
             </a:pPr>
-            <a:r>
-              <a:rPr lang="es-MX" sz="900" dirty="0"/>
-              <a:t>La evaluación general de relevancia (cobertura, novedad y sesgo de popularidad) muestra que el sistema puede cubrir una porción significativa de los ítems disponibles, mientras se esfuerza por reducir el sesgo hacia los ítems populares.</a:t>
-            </a:r>
+            <a:endParaRPr lang="es-MX" sz="900" dirty="0"/>
           </a:p>
           <a:p>
             <a:pPr marL="171450" indent="-171450" algn="just">
               <a:buFont typeface="Wingdings" panose="05000000000000000000" pitchFamily="2" charset="2"/>
               <a:buChar char="Ø"/>
             </a:pPr>
-            <a:endParaRPr lang="es-MX" sz="900" dirty="0"/>
+            <a:r>
+              <a:rPr lang="es-MX" sz="900" dirty="0"/>
+              <a:t>Este proyecto demuestra el potencial de los modelos de dos torres en la educación personalizada y plantea nuevas oportunidades de investigación.</a:t>
+            </a:r>
           </a:p>
           <a:p>
             <a:pPr marL="171450" indent="-171450" algn="just">
               <a:buFont typeface="Wingdings" panose="05000000000000000000" pitchFamily="2" charset="2"/>
               <a:buChar char="Ø"/>
             </a:pPr>
-            <a:r>
-              <a:rPr lang="es-MX" sz="900" dirty="0"/>
-              <a:t>Modelos como el SparseTwoTowerV3 obtienen métricas de novedad más altas, destacándose por recomendar ítems menos populares y fomentando la diversidad en las recomendaciones.</a:t>
-            </a:r>
-            <a:endParaRPr lang="es-MX" sz="600" dirty="0"/>
+            <a:endParaRPr lang="es-MX" sz="900" dirty="0"/>
           </a:p>
         </p:txBody>
       </p:sp>
@@ -13358,7 +13318,7 @@
         </p:nvGrpSpPr>
         <p:grpSpPr>
           <a:xfrm>
-            <a:off x="1000128" y="2795914"/>
+            <a:off x="1000127" y="2650590"/>
             <a:ext cx="7143741" cy="2169825"/>
             <a:chOff x="1231645" y="2818656"/>
             <a:chExt cx="7143741" cy="2169825"/>
@@ -15077,21 +15037,19 @@
         </p:blipFill>
         <p:spPr>
           <a:xfrm>
-            <a:off x="4502235" y="804616"/>
-            <a:ext cx="3862441" cy="2489041"/>
+            <a:off x="6130306" y="1316502"/>
+            <a:ext cx="2400935" cy="1547215"/>
           </a:xfrm>
           <a:prstGeom prst="rect">
             <a:avLst/>
           </a:prstGeom>
-          <a:ln w="38100" cap="sq">
+          <a:ln>
             <a:noFill/>
-            <a:prstDash val="solid"/>
-            <a:miter lim="800000"/>
           </a:ln>
           <a:effectLst>
-            <a:outerShdw blurRad="50800" dist="38100" dir="2700000" algn="tl" rotWithShape="0">
-              <a:srgbClr val="000000">
-                <a:alpha val="43000"/>
+            <a:outerShdw blurRad="292100" dist="139700" dir="2700000" algn="tl" rotWithShape="0">
+              <a:srgbClr val="333333">
+                <a:alpha val="65000"/>
               </a:srgbClr>
             </a:outerShdw>
           </a:effectLst>
@@ -15111,8 +15069,8 @@
         </p:nvSpPr>
         <p:spPr>
           <a:xfrm>
-            <a:off x="4345306" y="3505013"/>
-            <a:ext cx="3970718" cy="1092607"/>
+            <a:off x="6130303" y="3135990"/>
+            <a:ext cx="2395787" cy="992579"/>
           </a:xfrm>
           <a:prstGeom prst="rect">
             <a:avLst/>
@@ -15135,11 +15093,11 @@
               <a:buNone/>
             </a:pPr>
             <a:r>
-              <a:rPr lang="en-US" dirty="0"/>
+              <a:rPr lang="en-US" sz="1050" dirty="0"/>
               <a:t>A Deep Learning-Based Course Recommender System for Sustainable Development in Education</a:t>
             </a:r>
             <a:r>
-              <a:rPr lang="es-CL" dirty="0"/>
+              <a:rPr lang="es-CL" sz="1050" dirty="0"/>
               <a:t> (2021).</a:t>
             </a:r>
           </a:p>
@@ -15154,12 +15112,12 @@
               <a:buNone/>
             </a:pPr>
             <a:r>
-              <a:rPr lang="es-CL" sz="900" dirty="0"/>
+              <a:rPr lang="es-CL" sz="600" dirty="0"/>
               <a:t>https://doi.org/10.3390/app11198993</a:t>
             </a:r>
           </a:p>
           <a:p>
-            <a:endParaRPr lang="es-CL" dirty="0"/>
+            <a:endParaRPr lang="es-CL" sz="1050" dirty="0"/>
           </a:p>
         </p:txBody>
       </p:sp>
@@ -15185,12 +15143,22 @@
         </p:blipFill>
         <p:spPr>
           <a:xfrm>
-            <a:off x="262706" y="1562262"/>
-            <a:ext cx="2728688" cy="1494447"/>
+            <a:off x="491090" y="1293290"/>
+            <a:ext cx="2395787" cy="1547215"/>
           </a:xfrm>
           <a:prstGeom prst="rect">
             <a:avLst/>
           </a:prstGeom>
+          <a:ln>
+            <a:noFill/>
+          </a:ln>
+          <a:effectLst>
+            <a:outerShdw blurRad="292100" dist="139700" dir="2700000" algn="tl" rotWithShape="0">
+              <a:srgbClr val="333333">
+                <a:alpha val="65000"/>
+              </a:srgbClr>
+            </a:outerShdw>
+          </a:effectLst>
         </p:spPr>
       </p:pic>
       <p:sp>
@@ -15207,8 +15175,8 @@
         </p:nvSpPr>
         <p:spPr>
           <a:xfrm>
-            <a:off x="437710" y="3203222"/>
-            <a:ext cx="2997319" cy="877163"/>
+            <a:off x="491090" y="3135990"/>
+            <a:ext cx="2395788" cy="669414"/>
           </a:xfrm>
           <a:prstGeom prst="rect">
             <a:avLst/>
@@ -15231,7 +15199,7 @@
               <a:buNone/>
             </a:pPr>
             <a:r>
-              <a:rPr lang="en-US" b="0" i="0" dirty="0">
+              <a:rPr lang="en-US" sz="1050" b="0" i="0" dirty="0">
                 <a:effectLst/>
                 <a:latin typeface="Arial" panose="020B0604020202020204" pitchFamily="34" charset="0"/>
               </a:rPr>
@@ -15249,10 +15217,10 @@
               <a:buNone/>
             </a:pPr>
             <a:r>
-              <a:rPr lang="es-CL" sz="900" dirty="0"/>
+              <a:rPr lang="es-CL" sz="600" dirty="0"/>
               <a:t>https://doi.org/10.1145/3366424.3386195</a:t>
             </a:r>
-            <a:endParaRPr lang="es-CL" dirty="0"/>
+            <a:endParaRPr lang="es-CL" sz="1050" dirty="0"/>
           </a:p>
         </p:txBody>
       </p:sp>
@@ -15278,12 +15246,22 @@
         </p:blipFill>
         <p:spPr>
           <a:xfrm>
-            <a:off x="1833381" y="1327417"/>
-            <a:ext cx="4113573" cy="2038399"/>
+            <a:off x="3310698" y="1316502"/>
+            <a:ext cx="2395787" cy="1547215"/>
           </a:xfrm>
           <a:prstGeom prst="rect">
             <a:avLst/>
           </a:prstGeom>
+          <a:ln>
+            <a:noFill/>
+          </a:ln>
+          <a:effectLst>
+            <a:outerShdw blurRad="292100" dist="139700" dir="2700000" algn="tl" rotWithShape="0">
+              <a:srgbClr val="333333">
+                <a:alpha val="65000"/>
+              </a:srgbClr>
+            </a:outerShdw>
+          </a:effectLst>
         </p:spPr>
       </p:pic>
       <p:sp>
@@ -15300,8 +15278,8 @@
         </p:nvSpPr>
         <p:spPr>
           <a:xfrm>
-            <a:off x="1936369" y="4204599"/>
-            <a:ext cx="2997319" cy="877163"/>
+            <a:off x="3310697" y="3135990"/>
+            <a:ext cx="2395787" cy="669414"/>
           </a:xfrm>
           <a:prstGeom prst="rect">
             <a:avLst/>
@@ -15324,7 +15302,7 @@
               <a:buNone/>
             </a:pPr>
             <a:r>
-              <a:rPr lang="en-US" b="0" i="0" dirty="0">
+              <a:rPr lang="en-US" sz="1050" b="0" i="0" dirty="0">
                 <a:effectLst/>
                 <a:latin typeface="Arial" panose="020B0604020202020204" pitchFamily="34" charset="0"/>
               </a:rPr>
@@ -15342,10 +15320,10 @@
               <a:buNone/>
             </a:pPr>
             <a:r>
-              <a:rPr lang="es-CL" sz="900" dirty="0"/>
+              <a:rPr lang="es-CL" sz="600" dirty="0"/>
               <a:t>https://doi.org/10.1145/3511808.3557072</a:t>
             </a:r>
-            <a:endParaRPr lang="es-CL" dirty="0"/>
+            <a:endParaRPr lang="es-CL" sz="1050" dirty="0"/>
           </a:p>
         </p:txBody>
       </p:sp>
@@ -16241,6 +16219,373 @@
         <p:cNvPr id="1" name="Shape 69">
           <a:extLst>
             <a:ext uri="{FF2B5EF4-FFF2-40B4-BE49-F238E27FC236}">
+              <a16:creationId xmlns:a16="http://schemas.microsoft.com/office/drawing/2014/main" id="{27B9CDEC-5E19-1242-EF53-80BCF3851521}"/>
+            </a:ext>
+          </a:extLst>
+        </p:cNvPr>
+        <p:cNvGrpSpPr/>
+        <p:nvPr/>
+      </p:nvGrpSpPr>
+      <p:grpSpPr>
+        <a:xfrm>
+          <a:off x="0" y="0"/>
+          <a:ext cx="0" cy="0"/>
+          <a:chOff x="0" y="0"/>
+          <a:chExt cx="0" cy="0"/>
+        </a:xfrm>
+      </p:grpSpPr>
+      <p:pic>
+        <p:nvPicPr>
+          <p:cNvPr id="70" name="Google Shape;70;p14">
+            <a:extLst>
+              <a:ext uri="{FF2B5EF4-FFF2-40B4-BE49-F238E27FC236}">
+                <a16:creationId xmlns:a16="http://schemas.microsoft.com/office/drawing/2014/main" id="{1BE34A4D-DDA2-1231-E2A9-CC888DC60A46}"/>
+              </a:ext>
+            </a:extLst>
+          </p:cNvPr>
+          <p:cNvPicPr preferRelativeResize="0"/>
+          <p:nvPr/>
+        </p:nvPicPr>
+        <p:blipFill rotWithShape="1">
+          <a:blip r:embed="rId3">
+            <a:alphaModFix/>
+          </a:blip>
+          <a:srcRect l="-150" t="20538" r="150" b="51650"/>
+          <a:stretch/>
+        </p:blipFill>
+        <p:spPr>
+          <a:xfrm>
+            <a:off x="-14013" y="-8905"/>
+            <a:ext cx="9172027" cy="602165"/>
+          </a:xfrm>
+          <a:prstGeom prst="rect">
+            <a:avLst/>
+          </a:prstGeom>
+          <a:noFill/>
+          <a:ln>
+            <a:noFill/>
+          </a:ln>
+        </p:spPr>
+      </p:pic>
+      <p:pic>
+        <p:nvPicPr>
+          <p:cNvPr id="71" name="Google Shape;71;p14">
+            <a:extLst>
+              <a:ext uri="{FF2B5EF4-FFF2-40B4-BE49-F238E27FC236}">
+                <a16:creationId xmlns:a16="http://schemas.microsoft.com/office/drawing/2014/main" id="{B51D8963-3010-4DDB-C3E8-DFFB7F99BD2A}"/>
+              </a:ext>
+            </a:extLst>
+          </p:cNvPr>
+          <p:cNvPicPr preferRelativeResize="0"/>
+          <p:nvPr/>
+        </p:nvPicPr>
+        <p:blipFill rotWithShape="1">
+          <a:blip r:embed="rId4">
+            <a:alphaModFix/>
+          </a:blip>
+          <a:srcRect/>
+          <a:stretch/>
+        </p:blipFill>
+        <p:spPr>
+          <a:xfrm>
+            <a:off x="8316024" y="67165"/>
+            <a:ext cx="539441" cy="450022"/>
+          </a:xfrm>
+          <a:prstGeom prst="rect">
+            <a:avLst/>
+          </a:prstGeom>
+          <a:noFill/>
+          <a:ln>
+            <a:noFill/>
+          </a:ln>
+        </p:spPr>
+      </p:pic>
+      <p:sp>
+        <p:nvSpPr>
+          <p:cNvPr id="72" name="Google Shape;72;p14">
+            <a:extLst>
+              <a:ext uri="{FF2B5EF4-FFF2-40B4-BE49-F238E27FC236}">
+                <a16:creationId xmlns:a16="http://schemas.microsoft.com/office/drawing/2014/main" id="{DE59D461-D025-7FB9-49FC-F0818BE5CE53}"/>
+              </a:ext>
+            </a:extLst>
+          </p:cNvPr>
+          <p:cNvSpPr txBox="1"/>
+          <p:nvPr/>
+        </p:nvSpPr>
+        <p:spPr>
+          <a:xfrm>
+            <a:off x="65921" y="67165"/>
+            <a:ext cx="7804500" cy="461624"/>
+          </a:xfrm>
+          <a:prstGeom prst="rect">
+            <a:avLst/>
+          </a:prstGeom>
+          <a:noFill/>
+          <a:ln>
+            <a:noFill/>
+          </a:ln>
+        </p:spPr>
+        <p:txBody>
+          <a:bodyPr spcFirstLastPara="1" wrap="square" lIns="91425" tIns="45700" rIns="91425" bIns="45700" anchor="t" anchorCtr="0">
+            <a:spAutoFit/>
+          </a:bodyPr>
+          <a:lstStyle/>
+          <a:p>
+            <a:pPr marL="0" marR="0" lvl="0" indent="0" algn="l" rtl="0">
+              <a:lnSpc>
+                <a:spcPct val="100000"/>
+              </a:lnSpc>
+              <a:spcBef>
+                <a:spcPts val="0"/>
+              </a:spcBef>
+              <a:spcAft>
+                <a:spcPts val="0"/>
+              </a:spcAft>
+              <a:buClr>
+                <a:srgbClr val="FFFFFF"/>
+              </a:buClr>
+              <a:buSzPts val="2400"/>
+              <a:buFont typeface="Helvetica Neue"/>
+              <a:buNone/>
+            </a:pPr>
+            <a:r>
+              <a:rPr lang="es-419" sz="2400" b="1" dirty="0">
+                <a:solidFill>
+                  <a:srgbClr val="FFFFFF"/>
+                </a:solidFill>
+                <a:latin typeface="+mj-lt"/>
+                <a:ea typeface="Helvetica Neue"/>
+                <a:cs typeface="Helvetica Neue"/>
+                <a:sym typeface="Helvetica Neue"/>
+              </a:rPr>
+              <a:t>Planificación</a:t>
+            </a:r>
+            <a:r>
+              <a:rPr lang="es-419" sz="2400" b="1" i="0" u="none" strike="noStrike" cap="none" dirty="0">
+                <a:solidFill>
+                  <a:srgbClr val="FFFFFF"/>
+                </a:solidFill>
+                <a:latin typeface="+mj-lt"/>
+                <a:ea typeface="Helvetica Neue"/>
+                <a:cs typeface="Helvetica Neue"/>
+                <a:sym typeface="Helvetica Neue"/>
+              </a:rPr>
+              <a:t> </a:t>
+            </a:r>
+            <a:endParaRPr sz="1200" b="1" i="0" u="none" strike="noStrike" cap="none" dirty="0">
+              <a:solidFill>
+                <a:srgbClr val="FFFFFF"/>
+              </a:solidFill>
+              <a:latin typeface="+mj-lt"/>
+              <a:ea typeface="Helvetica Neue"/>
+              <a:cs typeface="Helvetica Neue"/>
+              <a:sym typeface="Helvetica Neue"/>
+            </a:endParaRPr>
+          </a:p>
+        </p:txBody>
+      </p:sp>
+      <p:sp>
+        <p:nvSpPr>
+          <p:cNvPr id="73" name="Google Shape;73;p14">
+            <a:extLst>
+              <a:ext uri="{FF2B5EF4-FFF2-40B4-BE49-F238E27FC236}">
+                <a16:creationId xmlns:a16="http://schemas.microsoft.com/office/drawing/2014/main" id="{75A14E29-D417-35B4-6AE4-79F1F8EDABF5}"/>
+              </a:ext>
+            </a:extLst>
+          </p:cNvPr>
+          <p:cNvSpPr txBox="1">
+            <a:spLocks noGrp="1"/>
+          </p:cNvSpPr>
+          <p:nvPr>
+            <p:ph type="sldNum" idx="12"/>
+          </p:nvPr>
+        </p:nvSpPr>
+        <p:spPr>
+          <a:xfrm>
+            <a:off x="8472458" y="4663217"/>
+            <a:ext cx="548700" cy="393600"/>
+          </a:xfrm>
+          <a:prstGeom prst="rect">
+            <a:avLst/>
+          </a:prstGeom>
+        </p:spPr>
+        <p:txBody>
+          <a:bodyPr spcFirstLastPara="1" wrap="square" lIns="91425" tIns="91425" rIns="91425" bIns="91425" anchor="ctr" anchorCtr="0">
+            <a:normAutofit/>
+          </a:bodyPr>
+          <a:lstStyle/>
+          <a:p>
+            <a:pPr marL="0" lvl="0" indent="0" algn="r" rtl="0">
+              <a:spcBef>
+                <a:spcPts val="0"/>
+              </a:spcBef>
+              <a:spcAft>
+                <a:spcPts val="0"/>
+              </a:spcAft>
+              <a:buNone/>
+            </a:pPr>
+            <a:fld id="{00000000-1234-1234-1234-123412341234}" type="slidenum">
+              <a:rPr lang="es-419"/>
+              <a:t>7</a:t>
+            </a:fld>
+            <a:endParaRPr/>
+          </a:p>
+        </p:txBody>
+      </p:sp>
+      <p:graphicFrame>
+        <p:nvGraphicFramePr>
+          <p:cNvPr id="2" name="Objeto 1">
+            <a:extLst>
+              <a:ext uri="{FF2B5EF4-FFF2-40B4-BE49-F238E27FC236}">
+                <a16:creationId xmlns:a16="http://schemas.microsoft.com/office/drawing/2014/main" id="{BA80F1AE-59DB-0144-917A-6F9A48602422}"/>
+              </a:ext>
+            </a:extLst>
+          </p:cNvPr>
+          <p:cNvGraphicFramePr>
+            <a:graphicFrameLocks noChangeAspect="1"/>
+          </p:cNvGraphicFramePr>
+          <p:nvPr>
+            <p:extLst>
+              <p:ext uri="{D42A27DB-BD31-4B8C-83A1-F6EECF244321}">
+                <p14:modId xmlns:p14="http://schemas.microsoft.com/office/powerpoint/2010/main" val="3735461578"/>
+              </p:ext>
+            </p:extLst>
+          </p:nvPr>
+        </p:nvGraphicFramePr>
+        <p:xfrm>
+          <a:off x="234183" y="1694920"/>
+          <a:ext cx="8568472" cy="1387914"/>
+        </p:xfrm>
+        <a:graphic>
+          <a:graphicData uri="http://schemas.openxmlformats.org/presentationml/2006/ole">
+            <mc:AlternateContent xmlns:mc="http://schemas.openxmlformats.org/markup-compatibility/2006">
+              <mc:Choice xmlns:v="urn:schemas-microsoft-com:vml" Requires="v">
+                <p:oleObj name="Worksheet" r:id="rId5" imgW="15697141" imgH="2543312" progId="Excel.Sheet.12">
+                  <p:embed/>
+                </p:oleObj>
+              </mc:Choice>
+              <mc:Fallback>
+                <p:oleObj name="Worksheet" r:id="rId5" imgW="15697141" imgH="2543312" progId="Excel.Sheet.12">
+                  <p:embed/>
+                  <p:pic>
+                    <p:nvPicPr>
+                      <p:cNvPr id="0" name=""/>
+                      <p:cNvPicPr/>
+                      <p:nvPr/>
+                    </p:nvPicPr>
+                    <p:blipFill>
+                      <a:blip r:embed="rId6"/>
+                      <a:stretch>
+                        <a:fillRect/>
+                      </a:stretch>
+                    </p:blipFill>
+                    <p:spPr>
+                      <a:xfrm>
+                        <a:off x="234183" y="1694920"/>
+                        <a:ext cx="8568472" cy="1387914"/>
+                      </a:xfrm>
+                      <a:prstGeom prst="rect">
+                        <a:avLst/>
+                      </a:prstGeom>
+                    </p:spPr>
+                  </p:pic>
+                </p:oleObj>
+              </mc:Fallback>
+            </mc:AlternateContent>
+          </a:graphicData>
+        </a:graphic>
+      </p:graphicFrame>
+      <p:sp>
+        <p:nvSpPr>
+          <p:cNvPr id="3" name="CuadroTexto 2">
+            <a:extLst>
+              <a:ext uri="{FF2B5EF4-FFF2-40B4-BE49-F238E27FC236}">
+                <a16:creationId xmlns:a16="http://schemas.microsoft.com/office/drawing/2014/main" id="{87254B20-AC8C-749A-3F25-027236351823}"/>
+              </a:ext>
+            </a:extLst>
+          </p:cNvPr>
+          <p:cNvSpPr txBox="1"/>
+          <p:nvPr/>
+        </p:nvSpPr>
+        <p:spPr>
+          <a:xfrm>
+            <a:off x="2188030" y="3082834"/>
+            <a:ext cx="2076994" cy="307777"/>
+          </a:xfrm>
+          <a:prstGeom prst="rect">
+            <a:avLst/>
+          </a:prstGeom>
+          <a:noFill/>
+        </p:spPr>
+        <p:txBody>
+          <a:bodyPr wrap="square" rtlCol="0">
+            <a:spAutoFit/>
+          </a:bodyPr>
+          <a:lstStyle/>
+          <a:p>
+            <a:r>
+              <a:rPr lang="es-MX" dirty="0"/>
+              <a:t>Primer semestre - 2024</a:t>
+            </a:r>
+          </a:p>
+        </p:txBody>
+      </p:sp>
+      <p:sp>
+        <p:nvSpPr>
+          <p:cNvPr id="4" name="CuadroTexto 3">
+            <a:extLst>
+              <a:ext uri="{FF2B5EF4-FFF2-40B4-BE49-F238E27FC236}">
+                <a16:creationId xmlns:a16="http://schemas.microsoft.com/office/drawing/2014/main" id="{AD969145-9723-9F6D-CD04-FF990834B37C}"/>
+              </a:ext>
+            </a:extLst>
+          </p:cNvPr>
+          <p:cNvSpPr txBox="1"/>
+          <p:nvPr/>
+        </p:nvSpPr>
+        <p:spPr>
+          <a:xfrm>
+            <a:off x="5847803" y="3076301"/>
+            <a:ext cx="2255522" cy="307777"/>
+          </a:xfrm>
+          <a:prstGeom prst="rect">
+            <a:avLst/>
+          </a:prstGeom>
+          <a:noFill/>
+        </p:spPr>
+        <p:txBody>
+          <a:bodyPr wrap="square" rtlCol="0">
+            <a:spAutoFit/>
+          </a:bodyPr>
+          <a:lstStyle/>
+          <a:p>
+            <a:r>
+              <a:rPr lang="es-MX" dirty="0"/>
+              <a:t>Segundo semestre - 2024</a:t>
+            </a:r>
+          </a:p>
+        </p:txBody>
+      </p:sp>
+    </p:spTree>
+    <p:extLst>
+      <p:ext uri="{BB962C8B-B14F-4D97-AF65-F5344CB8AC3E}">
+        <p14:creationId xmlns:p14="http://schemas.microsoft.com/office/powerpoint/2010/main" val="2340208812"/>
+      </p:ext>
+    </p:extLst>
+  </p:cSld>
+  <p:clrMapOvr>
+    <a:masterClrMapping/>
+  </p:clrMapOvr>
+</p:sld>
+</file>
+
+<file path=ppt/slides/slide8.xml><?xml version="1.0" encoding="utf-8"?>
+<p:sld xmlns:a="http://schemas.openxmlformats.org/drawingml/2006/main" xmlns:r="http://schemas.openxmlformats.org/officeDocument/2006/relationships" xmlns:p="http://schemas.openxmlformats.org/presentationml/2006/main">
+  <p:cSld>
+    <p:spTree>
+      <p:nvGrpSpPr>
+        <p:cNvPr id="1" name="Shape 69">
+          <a:extLst>
+            <a:ext uri="{FF2B5EF4-FFF2-40B4-BE49-F238E27FC236}">
               <a16:creationId xmlns:a16="http://schemas.microsoft.com/office/drawing/2014/main" id="{975C4A2D-58D1-8CCB-978D-BA7745D14598}"/>
             </a:ext>
           </a:extLst>
@@ -16436,7 +16781,7 @@
             </a:pPr>
             <a:fld id="{00000000-1234-1234-1234-123412341234}" type="slidenum">
               <a:rPr lang="es-419"/>
-              <a:t>7</a:t>
+              <a:t>8</a:t>
             </a:fld>
             <a:endParaRPr/>
           </a:p>
@@ -16862,240 +17207,6 @@
     <p:extLst>
       <p:ext uri="{BB962C8B-B14F-4D97-AF65-F5344CB8AC3E}">
         <p14:creationId xmlns:p14="http://schemas.microsoft.com/office/powerpoint/2010/main" val="1845806955"/>
-      </p:ext>
-    </p:extLst>
-  </p:cSld>
-  <p:clrMapOvr>
-    <a:masterClrMapping/>
-  </p:clrMapOvr>
-</p:sld>
-</file>
-
-<file path=ppt/slides/slide8.xml><?xml version="1.0" encoding="utf-8"?>
-<p:sld xmlns:a="http://schemas.openxmlformats.org/drawingml/2006/main" xmlns:r="http://schemas.openxmlformats.org/officeDocument/2006/relationships" xmlns:p="http://schemas.openxmlformats.org/presentationml/2006/main">
-  <p:cSld>
-    <p:spTree>
-      <p:nvGrpSpPr>
-        <p:cNvPr id="1" name="Shape 69">
-          <a:extLst>
-            <a:ext uri="{FF2B5EF4-FFF2-40B4-BE49-F238E27FC236}">
-              <a16:creationId xmlns:a16="http://schemas.microsoft.com/office/drawing/2014/main" id="{27B9CDEC-5E19-1242-EF53-80BCF3851521}"/>
-            </a:ext>
-          </a:extLst>
-        </p:cNvPr>
-        <p:cNvGrpSpPr/>
-        <p:nvPr/>
-      </p:nvGrpSpPr>
-      <p:grpSpPr>
-        <a:xfrm>
-          <a:off x="0" y="0"/>
-          <a:ext cx="0" cy="0"/>
-          <a:chOff x="0" y="0"/>
-          <a:chExt cx="0" cy="0"/>
-        </a:xfrm>
-      </p:grpSpPr>
-      <p:pic>
-        <p:nvPicPr>
-          <p:cNvPr id="70" name="Google Shape;70;p14">
-            <a:extLst>
-              <a:ext uri="{FF2B5EF4-FFF2-40B4-BE49-F238E27FC236}">
-                <a16:creationId xmlns:a16="http://schemas.microsoft.com/office/drawing/2014/main" id="{1BE34A4D-DDA2-1231-E2A9-CC888DC60A46}"/>
-              </a:ext>
-            </a:extLst>
-          </p:cNvPr>
-          <p:cNvPicPr preferRelativeResize="0"/>
-          <p:nvPr/>
-        </p:nvPicPr>
-        <p:blipFill rotWithShape="1">
-          <a:blip r:embed="rId3">
-            <a:alphaModFix/>
-          </a:blip>
-          <a:srcRect l="-150" t="20538" r="150" b="51650"/>
-          <a:stretch/>
-        </p:blipFill>
-        <p:spPr>
-          <a:xfrm>
-            <a:off x="-14013" y="-8905"/>
-            <a:ext cx="9172027" cy="602165"/>
-          </a:xfrm>
-          <a:prstGeom prst="rect">
-            <a:avLst/>
-          </a:prstGeom>
-          <a:noFill/>
-          <a:ln>
-            <a:noFill/>
-          </a:ln>
-        </p:spPr>
-      </p:pic>
-      <p:pic>
-        <p:nvPicPr>
-          <p:cNvPr id="71" name="Google Shape;71;p14">
-            <a:extLst>
-              <a:ext uri="{FF2B5EF4-FFF2-40B4-BE49-F238E27FC236}">
-                <a16:creationId xmlns:a16="http://schemas.microsoft.com/office/drawing/2014/main" id="{B51D8963-3010-4DDB-C3E8-DFFB7F99BD2A}"/>
-              </a:ext>
-            </a:extLst>
-          </p:cNvPr>
-          <p:cNvPicPr preferRelativeResize="0"/>
-          <p:nvPr/>
-        </p:nvPicPr>
-        <p:blipFill rotWithShape="1">
-          <a:blip r:embed="rId4">
-            <a:alphaModFix/>
-          </a:blip>
-          <a:srcRect/>
-          <a:stretch/>
-        </p:blipFill>
-        <p:spPr>
-          <a:xfrm>
-            <a:off x="8316024" y="67165"/>
-            <a:ext cx="539441" cy="450022"/>
-          </a:xfrm>
-          <a:prstGeom prst="rect">
-            <a:avLst/>
-          </a:prstGeom>
-          <a:noFill/>
-          <a:ln>
-            <a:noFill/>
-          </a:ln>
-        </p:spPr>
-      </p:pic>
-      <p:sp>
-        <p:nvSpPr>
-          <p:cNvPr id="72" name="Google Shape;72;p14">
-            <a:extLst>
-              <a:ext uri="{FF2B5EF4-FFF2-40B4-BE49-F238E27FC236}">
-                <a16:creationId xmlns:a16="http://schemas.microsoft.com/office/drawing/2014/main" id="{DE59D461-D025-7FB9-49FC-F0818BE5CE53}"/>
-              </a:ext>
-            </a:extLst>
-          </p:cNvPr>
-          <p:cNvSpPr txBox="1"/>
-          <p:nvPr/>
-        </p:nvSpPr>
-        <p:spPr>
-          <a:xfrm>
-            <a:off x="65921" y="67165"/>
-            <a:ext cx="7804500" cy="461624"/>
-          </a:xfrm>
-          <a:prstGeom prst="rect">
-            <a:avLst/>
-          </a:prstGeom>
-          <a:noFill/>
-          <a:ln>
-            <a:noFill/>
-          </a:ln>
-        </p:spPr>
-        <p:txBody>
-          <a:bodyPr spcFirstLastPara="1" wrap="square" lIns="91425" tIns="45700" rIns="91425" bIns="45700" anchor="t" anchorCtr="0">
-            <a:spAutoFit/>
-          </a:bodyPr>
-          <a:lstStyle/>
-          <a:p>
-            <a:pPr marL="0" marR="0" lvl="0" indent="0" algn="l" rtl="0">
-              <a:lnSpc>
-                <a:spcPct val="100000"/>
-              </a:lnSpc>
-              <a:spcBef>
-                <a:spcPts val="0"/>
-              </a:spcBef>
-              <a:spcAft>
-                <a:spcPts val="0"/>
-              </a:spcAft>
-              <a:buClr>
-                <a:srgbClr val="FFFFFF"/>
-              </a:buClr>
-              <a:buSzPts val="2400"/>
-              <a:buFont typeface="Helvetica Neue"/>
-              <a:buNone/>
-            </a:pPr>
-            <a:r>
-              <a:rPr lang="es-419" sz="2400" b="1" dirty="0">
-                <a:solidFill>
-                  <a:srgbClr val="FFFFFF"/>
-                </a:solidFill>
-                <a:latin typeface="+mj-lt"/>
-                <a:ea typeface="Helvetica Neue"/>
-                <a:cs typeface="Helvetica Neue"/>
-                <a:sym typeface="Helvetica Neue"/>
-              </a:rPr>
-              <a:t>Planificación</a:t>
-            </a:r>
-            <a:r>
-              <a:rPr lang="es-419" sz="2400" b="1" i="0" u="none" strike="noStrike" cap="none" dirty="0">
-                <a:solidFill>
-                  <a:srgbClr val="FFFFFF"/>
-                </a:solidFill>
-                <a:latin typeface="+mj-lt"/>
-                <a:ea typeface="Helvetica Neue"/>
-                <a:cs typeface="Helvetica Neue"/>
-                <a:sym typeface="Helvetica Neue"/>
-              </a:rPr>
-              <a:t> </a:t>
-            </a:r>
-            <a:endParaRPr sz="1200" b="1" i="0" u="none" strike="noStrike" cap="none" dirty="0">
-              <a:solidFill>
-                <a:srgbClr val="FFFFFF"/>
-              </a:solidFill>
-              <a:latin typeface="+mj-lt"/>
-              <a:ea typeface="Helvetica Neue"/>
-              <a:cs typeface="Helvetica Neue"/>
-              <a:sym typeface="Helvetica Neue"/>
-            </a:endParaRPr>
-          </a:p>
-        </p:txBody>
-      </p:sp>
-      <p:sp>
-        <p:nvSpPr>
-          <p:cNvPr id="73" name="Google Shape;73;p14">
-            <a:extLst>
-              <a:ext uri="{FF2B5EF4-FFF2-40B4-BE49-F238E27FC236}">
-                <a16:creationId xmlns:a16="http://schemas.microsoft.com/office/drawing/2014/main" id="{75A14E29-D417-35B4-6AE4-79F1F8EDABF5}"/>
-              </a:ext>
-            </a:extLst>
-          </p:cNvPr>
-          <p:cNvSpPr txBox="1">
-            <a:spLocks noGrp="1"/>
-          </p:cNvSpPr>
-          <p:nvPr>
-            <p:ph type="sldNum" idx="12"/>
-          </p:nvPr>
-        </p:nvSpPr>
-        <p:spPr>
-          <a:xfrm>
-            <a:off x="8472458" y="4663217"/>
-            <a:ext cx="548700" cy="393600"/>
-          </a:xfrm>
-          <a:prstGeom prst="rect">
-            <a:avLst/>
-          </a:prstGeom>
-        </p:spPr>
-        <p:txBody>
-          <a:bodyPr spcFirstLastPara="1" wrap="square" lIns="91425" tIns="91425" rIns="91425" bIns="91425" anchor="ctr" anchorCtr="0">
-            <a:normAutofit/>
-          </a:bodyPr>
-          <a:lstStyle/>
-          <a:p>
-            <a:pPr marL="0" lvl="0" indent="0" algn="r" rtl="0">
-              <a:spcBef>
-                <a:spcPts val="0"/>
-              </a:spcBef>
-              <a:spcAft>
-                <a:spcPts val="0"/>
-              </a:spcAft>
-              <a:buNone/>
-            </a:pPr>
-            <a:fld id="{00000000-1234-1234-1234-123412341234}" type="slidenum">
-              <a:rPr lang="es-419"/>
-              <a:t>8</a:t>
-            </a:fld>
-            <a:endParaRPr/>
-          </a:p>
-        </p:txBody>
-      </p:sp>
-    </p:spTree>
-    <p:extLst>
-      <p:ext uri="{BB962C8B-B14F-4D97-AF65-F5344CB8AC3E}">
-        <p14:creationId xmlns:p14="http://schemas.microsoft.com/office/powerpoint/2010/main" val="2340208812"/>
       </p:ext>
     </p:extLst>
   </p:cSld>
@@ -17328,8 +17439,8 @@
         </p:nvSpPr>
         <p:spPr>
           <a:xfrm>
-            <a:off x="1303020" y="705033"/>
-            <a:ext cx="6537960" cy="3970318"/>
+            <a:off x="1303020" y="979353"/>
+            <a:ext cx="6537960" cy="3046988"/>
           </a:xfrm>
           <a:prstGeom prst="rect">
             <a:avLst/>
@@ -17365,7 +17476,7 @@
             </a:pPr>
             <a:r>
               <a:rPr lang="es-MX" sz="1200" dirty="0"/>
-              <a:t>Las características recopiladas incluyeron resultados de una prueba diagnóstica inicial, que evaluó conocimientos previos en programación, y el desempeño académico durante el semestre. </a:t>
+              <a:t>Las características recopiladas incluyeron resultados de una prueba diagnóstica inicial y el desempeño académico. </a:t>
             </a:r>
           </a:p>
           <a:p>
@@ -17379,24 +17490,7 @@
             </a:pPr>
             <a:r>
               <a:rPr lang="es-MX" sz="1200" dirty="0"/>
-              <a:t>Los datos fueron anonimizados y cumplieron normativas éticas, garantizando la privacidad de los estudiantes.</a:t>
-            </a:r>
-          </a:p>
-          <a:p>
-            <a:pPr marL="171450" indent="-171450" algn="just">
-              <a:buFont typeface="Arial" panose="020B0604020202020204" pitchFamily="34" charset="0"/>
-              <a:buChar char="•"/>
-            </a:pPr>
-            <a:endParaRPr lang="es-MX" sz="1200" dirty="0"/>
-          </a:p>
-          <a:p>
-            <a:pPr marL="171450" indent="-171450" algn="just">
-              <a:buFont typeface="Arial" panose="020B0604020202020204" pitchFamily="34" charset="0"/>
-              <a:buChar char="•"/>
-            </a:pPr>
-            <a:r>
-              <a:rPr lang="es-MX" sz="1200" dirty="0"/>
-              <a:t>De un total de 1306 registros iniciales, se limpiaron y seleccionaron 1092. De estos, el 70% correspondía a estudiantes que aprobaron la asignatura, proporcionando una base sólida para el análisis y desarrollo del sistema.</a:t>
+              <a:t>De un total de 1306 registros iniciales, se limpiaron y seleccionaron 1092. De estos, el 70% correspondía a estudiantes que aprobaron la asignatura, proporcionando una base sólida para el entrenamiento del sistema.</a:t>
             </a:r>
           </a:p>
           <a:p>
@@ -17417,20 +17511,17 @@
             </a:r>
           </a:p>
           <a:p>
+            <a:pPr algn="just"/>
+            <a:endParaRPr lang="es-MX" sz="1200" dirty="0"/>
+          </a:p>
+          <a:p>
             <a:pPr marL="171450" indent="-171450" algn="just">
               <a:buFont typeface="Arial" panose="020B0604020202020204" pitchFamily="34" charset="0"/>
               <a:buChar char="•"/>
             </a:pPr>
-            <a:endParaRPr lang="es-MX" sz="1200" dirty="0"/>
-          </a:p>
-          <a:p>
-            <a:pPr marL="171450" indent="-171450" algn="just">
-              <a:buFont typeface="Arial" panose="020B0604020202020204" pitchFamily="34" charset="0"/>
-              <a:buChar char="•"/>
-            </a:pPr>
             <a:r>
               <a:rPr lang="es-MX" sz="1200" dirty="0"/>
-              <a:t>Se limpiaron y analizaron los datos utilizando la metodología CRISP-DM, excluyendo estudiantes con información incompleta o irrelevante. Las variables categóricas, como el programa de estudio, fueron codificadas para su uso en los experimentos, mientras que datos faltantes en solemnes específicas se usaron solo como filtros.</a:t>
+              <a:t>Las variables categóricas, como el programa de estudio, fueron codificadas para su uso en los experimentos, mientras que datos faltantes en solemnes específicas se usaron solo como filtros.</a:t>
             </a:r>
           </a:p>
         </p:txBody>

</xml_diff>